<commit_message>
Chain of Trust concept
</commit_message>
<xml_diff>
--- a/docs/OtherSourceMaterial/Diagrams.pptx
+++ b/docs/OtherSourceMaterial/Diagrams.pptx
@@ -5,7 +5,7 @@
     <p:sldMasterId id="2147483648" r:id="rId1"/>
   </p:sldMasterIdLst>
   <p:notesMasterIdLst>
-    <p:notesMasterId r:id="rId12"/>
+    <p:notesMasterId r:id="rId13"/>
   </p:notesMasterIdLst>
   <p:sldIdLst>
     <p:sldId id="386" r:id="rId2"/>
@@ -17,7 +17,8 @@
     <p:sldId id="393" r:id="rId8"/>
     <p:sldId id="395" r:id="rId9"/>
     <p:sldId id="396" r:id="rId10"/>
-    <p:sldId id="397" r:id="rId11"/>
+    <p:sldId id="398" r:id="rId11"/>
+    <p:sldId id="397" r:id="rId12"/>
   </p:sldIdLst>
   <p:sldSz cx="12192000" cy="6858000"/>
   <p:notesSz cx="6858000" cy="9144000"/>
@@ -3444,6 +3445,113 @@
             <p:ph type="title"/>
           </p:nvPr>
         </p:nvSpPr>
+        <p:spPr/>
+        <p:txBody>
+          <a:bodyPr/>
+          <a:lstStyle/>
+          <a:p>
+            <a:r>
+              <a:rPr lang="en-US" dirty="0" smtClean="0"/>
+              <a:t>Admin Guide</a:t>
+            </a:r>
+            <a:endParaRPr lang="en-US" dirty="0"/>
+          </a:p>
+        </p:txBody>
+      </p:sp>
+      <p:sp>
+        <p:nvSpPr>
+          <p:cNvPr id="3" name="Text Placeholder 2"/>
+          <p:cNvSpPr>
+            <a:spLocks noGrp="1"/>
+          </p:cNvSpPr>
+          <p:nvPr>
+            <p:ph type="body" idx="1"/>
+          </p:nvPr>
+        </p:nvSpPr>
+        <p:spPr/>
+        <p:txBody>
+          <a:bodyPr/>
+          <a:lstStyle/>
+          <a:p>
+            <a:r>
+              <a:rPr lang="en-US" dirty="0" smtClean="0"/>
+              <a:t>Key </a:t>
+            </a:r>
+            <a:r>
+              <a:rPr lang="en-US" dirty="0" smtClean="0"/>
+              <a:t>Concepts, Identity </a:t>
+            </a:r>
+            <a:r>
+              <a:rPr lang="en-US" smtClean="0"/>
+              <a:t>and Chains of Trust</a:t>
+            </a:r>
+            <a:endParaRPr lang="en-US" dirty="0"/>
+          </a:p>
+        </p:txBody>
+      </p:sp>
+      <p:sp>
+        <p:nvSpPr>
+          <p:cNvPr id="4" name="Slide Number Placeholder 3"/>
+          <p:cNvSpPr>
+            <a:spLocks noGrp="1"/>
+          </p:cNvSpPr>
+          <p:nvPr>
+            <p:ph type="sldNum" sz="quarter" idx="12"/>
+          </p:nvPr>
+        </p:nvSpPr>
+        <p:spPr/>
+        <p:txBody>
+          <a:bodyPr/>
+          <a:lstStyle/>
+          <a:p>
+            <a:fld id="{2AF5F8E0-9CB9-8D41-B80C-6B76C9B710FC}" type="slidenum">
+              <a:rPr lang="en-US" smtClean="0"/>
+              <a:t>10</a:t>
+            </a:fld>
+            <a:endParaRPr lang="en-US"/>
+          </a:p>
+        </p:txBody>
+      </p:sp>
+    </p:spTree>
+    <p:extLst>
+      <p:ext uri="{BB962C8B-B14F-4D97-AF65-F5344CB8AC3E}">
+        <p14:creationId xmlns:p14="http://schemas.microsoft.com/office/powerpoint/2010/main" val="52439793"/>
+      </p:ext>
+    </p:extLst>
+  </p:cSld>
+  <p:clrMapOvr>
+    <a:masterClrMapping/>
+  </p:clrMapOvr>
+</p:sld>
+</file>
+
+<file path=ppt/slides/slide11.xml><?xml version="1.0" encoding="utf-8"?>
+<p:sld xmlns:a="http://schemas.openxmlformats.org/drawingml/2006/main" xmlns:r="http://schemas.openxmlformats.org/officeDocument/2006/relationships" xmlns:p="http://schemas.openxmlformats.org/presentationml/2006/main">
+  <p:cSld>
+    <p:spTree>
+      <p:nvGrpSpPr>
+        <p:cNvPr id="1" name=""/>
+        <p:cNvGrpSpPr/>
+        <p:nvPr/>
+      </p:nvGrpSpPr>
+      <p:grpSpPr>
+        <a:xfrm>
+          <a:off x="0" y="0"/>
+          <a:ext cx="0" cy="0"/>
+          <a:chOff x="0" y="0"/>
+          <a:chExt cx="0" cy="0"/>
+        </a:xfrm>
+      </p:grpSpPr>
+      <p:sp>
+        <p:nvSpPr>
+          <p:cNvPr id="2" name="Title 1"/>
+          <p:cNvSpPr>
+            <a:spLocks noGrp="1"/>
+          </p:cNvSpPr>
+          <p:nvPr>
+            <p:ph type="title"/>
+          </p:nvPr>
+        </p:nvSpPr>
         <p:spPr>
           <a:xfrm>
             <a:off x="814450" y="376687"/>
@@ -3459,8 +3567,8 @@
               <a:t>Diagram </a:t>
             </a:r>
             <a:r>
-              <a:rPr lang="en-US" dirty="0"/>
-              <a:t>6</a:t>
+              <a:rPr lang="en-US" dirty="0" smtClean="0"/>
+              <a:t>1</a:t>
             </a:r>
             <a:endParaRPr lang="en-US" dirty="0"/>
           </a:p>
@@ -3489,7 +3597,7 @@
             <a:fld id="{2AF5F8E0-9CB9-8D41-B80C-6B76C9B710FC}" type="slidenum">
               <a:rPr lang="en-US" smtClean="0"/>
               <a:pPr/>
-              <a:t>10</a:t>
+              <a:t>11</a:t>
             </a:fld>
             <a:endParaRPr lang="en-US"/>
           </a:p>
@@ -11237,7 +11345,11 @@
           <a:p>
             <a:r>
               <a:rPr lang="en-US" dirty="0" smtClean="0"/>
-              <a:t>Key Concepts</a:t>
+              <a:t>Key </a:t>
+            </a:r>
+            <a:r>
+              <a:rPr lang="en-US" dirty="0" smtClean="0"/>
+              <a:t>Concepts, A Blockchain Network</a:t>
             </a:r>
             <a:endParaRPr lang="en-US" dirty="0"/>
           </a:p>
@@ -14234,14 +14346,22 @@
           <a:p>
             <a:pPr algn="ctr"/>
             <a:r>
-              <a:rPr lang="en-US" sz="2400" b="1" dirty="0" smtClean="0">
+              <a:rPr lang="en-US" sz="2400" b="1" smtClean="0">
                 <a:solidFill>
                   <a:schemeClr val="bg1"/>
                 </a:solidFill>
               </a:rPr>
               <a:t>L</a:t>
             </a:r>
-            <a:endParaRPr lang="en-US" sz="2400" b="1" dirty="0">
+            <a:r>
+              <a:rPr lang="en-US" sz="2400" b="1" baseline="-25000">
+                <a:solidFill>
+                  <a:schemeClr val="bg1"/>
+                </a:solidFill>
+              </a:rPr>
+              <a:t>b</a:t>
+            </a:r>
+            <a:endParaRPr lang="en-US" sz="2400" b="1" baseline="-25000" dirty="0">
               <a:solidFill>
                 <a:schemeClr val="bg1"/>
               </a:solidFill>

</xml_diff>

<commit_message>
Peer and Identity updates
</commit_message>
<xml_diff>
--- a/docs/OtherSourceMaterial/Diagrams.pptx
+++ b/docs/OtherSourceMaterial/Diagrams.pptx
@@ -5,7 +5,7 @@
     <p:sldMasterId id="2147483648" r:id="rId1"/>
   </p:sldMasterIdLst>
   <p:notesMasterIdLst>
-    <p:notesMasterId r:id="rId25"/>
+    <p:notesMasterId r:id="rId28"/>
   </p:notesMasterIdLst>
   <p:sldIdLst>
     <p:sldId id="386" r:id="rId2"/>
@@ -31,6 +31,9 @@
     <p:sldId id="411" r:id="rId22"/>
     <p:sldId id="412" r:id="rId23"/>
     <p:sldId id="413" r:id="rId24"/>
+    <p:sldId id="414" r:id="rId25"/>
+    <p:sldId id="415" r:id="rId26"/>
+    <p:sldId id="416" r:id="rId27"/>
   </p:sldIdLst>
   <p:sldSz cx="12192000" cy="6858000"/>
   <p:notesSz cx="6858000" cy="9144000"/>
@@ -39096,14 +39099,10 @@
           <a:p>
             <a:r>
               <a:rPr lang="en-US" dirty="0" smtClean="0"/>
-              <a:t>Key Concepts</a:t>
+              <a:t>Key Concepts, </a:t>
             </a:r>
             <a:r>
-              <a:rPr lang="en-US" smtClean="0"/>
-              <a:t>, </a:t>
-            </a:r>
-            <a:r>
-              <a:rPr lang="en-US" smtClean="0"/>
+              <a:rPr lang="en-US" dirty="0" smtClean="0"/>
               <a:t>Peers</a:t>
             </a:r>
             <a:endParaRPr lang="en-US" dirty="0"/>
@@ -39143,6 +39142,3996 @@
   <p:clrMapOvr>
     <a:masterClrMapping/>
   </p:clrMapOvr>
+</p:sld>
+</file>
+
+<file path=ppt/slides/slide24.xml><?xml version="1.0" encoding="utf-8"?>
+<p:sld xmlns:a="http://schemas.openxmlformats.org/drawingml/2006/main" xmlns:r="http://schemas.openxmlformats.org/officeDocument/2006/relationships" xmlns:p="http://schemas.openxmlformats.org/presentationml/2006/main">
+  <p:cSld>
+    <p:spTree>
+      <p:nvGrpSpPr>
+        <p:cNvPr id="1" name=""/>
+        <p:cNvGrpSpPr/>
+        <p:nvPr/>
+      </p:nvGrpSpPr>
+      <p:grpSpPr>
+        <a:xfrm>
+          <a:off x="0" y="0"/>
+          <a:ext cx="0" cy="0"/>
+          <a:chOff x="0" y="0"/>
+          <a:chExt cx="0" cy="0"/>
+        </a:xfrm>
+      </p:grpSpPr>
+      <p:sp>
+        <p:nvSpPr>
+          <p:cNvPr id="2" name="Title 1"/>
+          <p:cNvSpPr>
+            <a:spLocks noGrp="1"/>
+          </p:cNvSpPr>
+          <p:nvPr>
+            <p:ph type="title"/>
+          </p:nvPr>
+        </p:nvSpPr>
+        <p:spPr>
+          <a:xfrm>
+            <a:off x="838200" y="400641"/>
+            <a:ext cx="10515600" cy="1325563"/>
+          </a:xfrm>
+        </p:spPr>
+        <p:txBody>
+          <a:bodyPr/>
+          <a:lstStyle/>
+          <a:p>
+            <a:r>
+              <a:rPr lang="en-US" dirty="0" smtClean="0"/>
+              <a:t>Diagram </a:t>
+            </a:r>
+            <a:r>
+              <a:rPr lang="en-US" dirty="0" smtClean="0"/>
+              <a:t>1</a:t>
+            </a:r>
+            <a:endParaRPr lang="en-US" dirty="0"/>
+          </a:p>
+        </p:txBody>
+      </p:sp>
+      <p:sp>
+        <p:nvSpPr>
+          <p:cNvPr id="4" name="Slide Number Placeholder 3"/>
+          <p:cNvSpPr>
+            <a:spLocks noGrp="1"/>
+          </p:cNvSpPr>
+          <p:nvPr>
+            <p:ph type="sldNum" sz="quarter" idx="12"/>
+          </p:nvPr>
+        </p:nvSpPr>
+        <p:spPr>
+          <a:xfrm>
+            <a:off x="276261" y="6356348"/>
+            <a:ext cx="2743200" cy="365125"/>
+          </a:xfrm>
+        </p:spPr>
+        <p:txBody>
+          <a:bodyPr/>
+          <a:lstStyle/>
+          <a:p>
+            <a:fld id="{2AF5F8E0-9CB9-8D41-B80C-6B76C9B710FC}" type="slidenum">
+              <a:rPr lang="en-US" smtClean="0"/>
+              <a:pPr/>
+              <a:t>24</a:t>
+            </a:fld>
+            <a:endParaRPr lang="en-US"/>
+          </a:p>
+        </p:txBody>
+      </p:sp>
+      <p:sp>
+        <p:nvSpPr>
+          <p:cNvPr id="5" name="Rounded Rectangle 4"/>
+          <p:cNvSpPr/>
+          <p:nvPr/>
+        </p:nvSpPr>
+        <p:spPr>
+          <a:xfrm>
+            <a:off x="2319129" y="2726972"/>
+            <a:ext cx="4692315" cy="3073286"/>
+          </a:xfrm>
+          <a:prstGeom prst="roundRect">
+            <a:avLst/>
+          </a:prstGeom>
+          <a:solidFill>
+            <a:srgbClr val="DBE4F3"/>
+          </a:solidFill>
+        </p:spPr>
+        <p:style>
+          <a:lnRef idx="2">
+            <a:schemeClr val="accent1">
+              <a:shade val="50000"/>
+            </a:schemeClr>
+          </a:lnRef>
+          <a:fillRef idx="1">
+            <a:schemeClr val="accent1"/>
+          </a:fillRef>
+          <a:effectRef idx="0">
+            <a:schemeClr val="accent1"/>
+          </a:effectRef>
+          <a:fontRef idx="minor">
+            <a:schemeClr val="lt1"/>
+          </a:fontRef>
+        </p:style>
+        <p:txBody>
+          <a:bodyPr rtlCol="0" anchor="ctr"/>
+          <a:lstStyle/>
+          <a:p>
+            <a:pPr algn="ctr"/>
+            <a:endParaRPr lang="en-US" dirty="0"/>
+          </a:p>
+        </p:txBody>
+      </p:sp>
+      <p:sp>
+        <p:nvSpPr>
+          <p:cNvPr id="53" name="TextBox 52"/>
+          <p:cNvSpPr txBox="1"/>
+          <p:nvPr/>
+        </p:nvSpPr>
+        <p:spPr>
+          <a:xfrm>
+            <a:off x="6458547" y="5236933"/>
+            <a:ext cx="527124" cy="461665"/>
+          </a:xfrm>
+          <a:prstGeom prst="rect">
+            <a:avLst/>
+          </a:prstGeom>
+          <a:noFill/>
+        </p:spPr>
+        <p:txBody>
+          <a:bodyPr wrap="square" rtlCol="0">
+            <a:spAutoFit/>
+          </a:bodyPr>
+          <a:lstStyle/>
+          <a:p>
+            <a:r>
+              <a:rPr lang="en-US" sz="2400" b="1" smtClean="0"/>
+              <a:t>N</a:t>
+            </a:r>
+            <a:endParaRPr lang="en-US" sz="2400" b="1"/>
+          </a:p>
+        </p:txBody>
+      </p:sp>
+      <p:graphicFrame>
+        <p:nvGraphicFramePr>
+          <p:cNvPr id="54" name="Table 53"/>
+          <p:cNvGraphicFramePr>
+            <a:graphicFrameLocks noGrp="1"/>
+          </p:cNvGraphicFramePr>
+          <p:nvPr>
+            <p:extLst>
+              <p:ext uri="{D42A27DB-BD31-4B8C-83A1-F6EECF244321}">
+                <p14:modId xmlns:p14="http://schemas.microsoft.com/office/powerpoint/2010/main" val="74335339"/>
+              </p:ext>
+            </p:extLst>
+          </p:nvPr>
+        </p:nvGraphicFramePr>
+        <p:xfrm>
+          <a:off x="7203881" y="2667030"/>
+          <a:ext cx="4565272" cy="2156886"/>
+        </p:xfrm>
+        <a:graphic>
+          <a:graphicData uri="http://schemas.openxmlformats.org/drawingml/2006/table">
+            <a:tbl>
+              <a:tblPr firstRow="1" bandRow="1">
+                <a:tableStyleId>{2D5ABB26-0587-4C30-8999-92F81FD0307C}</a:tableStyleId>
+              </a:tblPr>
+              <a:tblGrid>
+                <a:gridCol w="648469"/>
+                <a:gridCol w="1666672"/>
+                <a:gridCol w="602948"/>
+                <a:gridCol w="1647183"/>
+              </a:tblGrid>
+              <a:tr h="718962">
+                <a:tc>
+                  <a:txBody>
+                    <a:bodyPr/>
+                    <a:lstStyle/>
+                    <a:p>
+                      <a:pPr marL="0" marR="0" lvl="0" indent="0" algn="l" defTabSz="914400" rtl="0" eaLnBrk="1" fontAlgn="auto" latinLnBrk="0" hangingPunct="1">
+                        <a:lnSpc>
+                          <a:spcPct val="100000"/>
+                        </a:lnSpc>
+                        <a:spcBef>
+                          <a:spcPts val="0"/>
+                        </a:spcBef>
+                        <a:spcAft>
+                          <a:spcPts val="0"/>
+                        </a:spcAft>
+                        <a:buClrTx/>
+                        <a:buSzTx/>
+                        <a:buFontTx/>
+                        <a:buNone/>
+                        <a:tabLst/>
+                        <a:defRPr/>
+                      </a:pPr>
+                      <a:endParaRPr lang="en-US" sz="1400" dirty="0" smtClean="0"/>
+                    </a:p>
+                  </a:txBody>
+                  <a:tcPr anchor="ctr">
+                    <a:lnL w="12700" cap="flat" cmpd="sng" algn="ctr">
+                      <a:solidFill>
+                        <a:schemeClr val="tx1"/>
+                      </a:solidFill>
+                      <a:prstDash val="solid"/>
+                      <a:round/>
+                      <a:headEnd type="none" w="med" len="med"/>
+                      <a:tailEnd type="none" w="med" len="med"/>
+                    </a:lnL>
+                    <a:lnR w="12700" cap="flat" cmpd="sng" algn="ctr">
+                      <a:solidFill>
+                        <a:schemeClr val="tx1"/>
+                      </a:solidFill>
+                      <a:prstDash val="solid"/>
+                      <a:round/>
+                      <a:headEnd type="none" w="med" len="med"/>
+                      <a:tailEnd type="none" w="med" len="med"/>
+                    </a:lnR>
+                    <a:lnT w="12700" cap="flat" cmpd="sng" algn="ctr">
+                      <a:solidFill>
+                        <a:schemeClr val="tx1"/>
+                      </a:solidFill>
+                      <a:prstDash val="solid"/>
+                      <a:round/>
+                      <a:headEnd type="none" w="med" len="med"/>
+                      <a:tailEnd type="none" w="med" len="med"/>
+                    </a:lnT>
+                    <a:lnB w="12700" cap="flat" cmpd="sng" algn="ctr">
+                      <a:solidFill>
+                        <a:schemeClr val="tx1"/>
+                      </a:solidFill>
+                      <a:prstDash val="solid"/>
+                      <a:round/>
+                      <a:headEnd type="none" w="med" len="med"/>
+                      <a:tailEnd type="none" w="med" len="med"/>
+                    </a:lnB>
+                    <a:lnTlToBr w="12700" cmpd="sng">
+                      <a:noFill/>
+                      <a:prstDash val="solid"/>
+                    </a:lnTlToBr>
+                    <a:lnBlToTr w="12700" cmpd="sng">
+                      <a:noFill/>
+                      <a:prstDash val="solid"/>
+                    </a:lnBlToTr>
+                  </a:tcPr>
+                </a:tc>
+                <a:tc>
+                  <a:txBody>
+                    <a:bodyPr/>
+                    <a:lstStyle/>
+                    <a:p>
+                      <a:pPr lvl="0"/>
+                      <a:r>
+                        <a:rPr lang="en-US" sz="1400" dirty="0" smtClean="0"/>
+                        <a:t>Blockchain</a:t>
+                      </a:r>
+                      <a:r>
+                        <a:rPr lang="en-US" sz="1400" baseline="0" dirty="0" smtClean="0"/>
+                        <a:t> Network</a:t>
+                      </a:r>
+                      <a:endParaRPr lang="en-US" sz="1400" dirty="0"/>
+                    </a:p>
+                  </a:txBody>
+                  <a:tcPr anchor="ctr">
+                    <a:lnL w="12700" cap="flat" cmpd="sng" algn="ctr">
+                      <a:solidFill>
+                        <a:schemeClr val="tx1"/>
+                      </a:solidFill>
+                      <a:prstDash val="solid"/>
+                      <a:round/>
+                      <a:headEnd type="none" w="med" len="med"/>
+                      <a:tailEnd type="none" w="med" len="med"/>
+                    </a:lnL>
+                    <a:lnR w="12700" cap="flat" cmpd="sng" algn="ctr">
+                      <a:solidFill>
+                        <a:schemeClr val="tx1"/>
+                      </a:solidFill>
+                      <a:prstDash val="solid"/>
+                      <a:round/>
+                      <a:headEnd type="none" w="med" len="med"/>
+                      <a:tailEnd type="none" w="med" len="med"/>
+                    </a:lnR>
+                    <a:lnT w="12700" cap="flat" cmpd="sng" algn="ctr">
+                      <a:solidFill>
+                        <a:schemeClr val="tx1"/>
+                      </a:solidFill>
+                      <a:prstDash val="solid"/>
+                      <a:round/>
+                      <a:headEnd type="none" w="med" len="med"/>
+                      <a:tailEnd type="none" w="med" len="med"/>
+                    </a:lnT>
+                    <a:lnB w="12700" cap="flat" cmpd="sng" algn="ctr">
+                      <a:solidFill>
+                        <a:schemeClr val="tx1"/>
+                      </a:solidFill>
+                      <a:prstDash val="solid"/>
+                      <a:round/>
+                      <a:headEnd type="none" w="med" len="med"/>
+                      <a:tailEnd type="none" w="med" len="med"/>
+                    </a:lnB>
+                    <a:lnTlToBr w="12700" cmpd="sng">
+                      <a:noFill/>
+                      <a:prstDash val="solid"/>
+                    </a:lnTlToBr>
+                    <a:lnBlToTr w="12700" cmpd="sng">
+                      <a:noFill/>
+                      <a:prstDash val="solid"/>
+                    </a:lnBlToTr>
+                  </a:tcPr>
+                </a:tc>
+                <a:tc>
+                  <a:txBody>
+                    <a:bodyPr/>
+                    <a:lstStyle/>
+                    <a:p>
+                      <a:pPr marL="0" marR="0" lvl="0" indent="0" algn="l" defTabSz="914400" rtl="0" eaLnBrk="1" fontAlgn="auto" latinLnBrk="0" hangingPunct="1">
+                        <a:lnSpc>
+                          <a:spcPct val="100000"/>
+                        </a:lnSpc>
+                        <a:spcBef>
+                          <a:spcPts val="0"/>
+                        </a:spcBef>
+                        <a:spcAft>
+                          <a:spcPts val="0"/>
+                        </a:spcAft>
+                        <a:buClrTx/>
+                        <a:buSzTx/>
+                        <a:buFontTx/>
+                        <a:buNone/>
+                        <a:tabLst/>
+                        <a:defRPr/>
+                      </a:pPr>
+                      <a:endParaRPr lang="en-US" sz="1400" dirty="0" smtClean="0"/>
+                    </a:p>
+                  </a:txBody>
+                  <a:tcPr anchor="ctr">
+                    <a:lnL w="12700" cap="flat" cmpd="sng" algn="ctr">
+                      <a:solidFill>
+                        <a:schemeClr val="tx1"/>
+                      </a:solidFill>
+                      <a:prstDash val="solid"/>
+                      <a:round/>
+                      <a:headEnd type="none" w="med" len="med"/>
+                      <a:tailEnd type="none" w="med" len="med"/>
+                    </a:lnL>
+                    <a:lnR w="12700" cap="flat" cmpd="sng" algn="ctr">
+                      <a:solidFill>
+                        <a:schemeClr val="tx1"/>
+                      </a:solidFill>
+                      <a:prstDash val="solid"/>
+                      <a:round/>
+                      <a:headEnd type="none" w="med" len="med"/>
+                      <a:tailEnd type="none" w="med" len="med"/>
+                    </a:lnR>
+                    <a:lnT w="12700" cap="flat" cmpd="sng" algn="ctr">
+                      <a:solidFill>
+                        <a:schemeClr val="tx1"/>
+                      </a:solidFill>
+                      <a:prstDash val="solid"/>
+                      <a:round/>
+                      <a:headEnd type="none" w="med" len="med"/>
+                      <a:tailEnd type="none" w="med" len="med"/>
+                    </a:lnT>
+                    <a:lnB w="12700" cap="flat" cmpd="sng" algn="ctr">
+                      <a:solidFill>
+                        <a:schemeClr val="tx1"/>
+                      </a:solidFill>
+                      <a:prstDash val="solid"/>
+                      <a:round/>
+                      <a:headEnd type="none" w="med" len="med"/>
+                      <a:tailEnd type="none" w="med" len="med"/>
+                    </a:lnB>
+                    <a:lnTlToBr w="12700" cmpd="sng">
+                      <a:noFill/>
+                      <a:prstDash val="solid"/>
+                    </a:lnTlToBr>
+                    <a:lnBlToTr w="12700" cmpd="sng">
+                      <a:noFill/>
+                      <a:prstDash val="solid"/>
+                    </a:lnBlToTr>
+                  </a:tcPr>
+                </a:tc>
+                <a:tc>
+                  <a:txBody>
+                    <a:bodyPr/>
+                    <a:lstStyle/>
+                    <a:p>
+                      <a:pPr marL="0" marR="0" lvl="0" indent="0" algn="l" defTabSz="914400" rtl="0" eaLnBrk="1" fontAlgn="auto" latinLnBrk="0" hangingPunct="1">
+                        <a:lnSpc>
+                          <a:spcPct val="100000"/>
+                        </a:lnSpc>
+                        <a:spcBef>
+                          <a:spcPts val="0"/>
+                        </a:spcBef>
+                        <a:spcAft>
+                          <a:spcPts val="0"/>
+                        </a:spcAft>
+                        <a:buClrTx/>
+                        <a:buSzTx/>
+                        <a:buFontTx/>
+                        <a:buNone/>
+                        <a:tabLst/>
+                        <a:defRPr/>
+                      </a:pPr>
+                      <a:r>
+                        <a:rPr lang="en-US" sz="1400" dirty="0" smtClean="0"/>
+                        <a:t>Smart contract</a:t>
+                      </a:r>
+                    </a:p>
+                  </a:txBody>
+                  <a:tcPr anchor="ctr">
+                    <a:lnL w="12700" cap="flat" cmpd="sng" algn="ctr">
+                      <a:solidFill>
+                        <a:schemeClr val="tx1"/>
+                      </a:solidFill>
+                      <a:prstDash val="solid"/>
+                      <a:round/>
+                      <a:headEnd type="none" w="med" len="med"/>
+                      <a:tailEnd type="none" w="med" len="med"/>
+                    </a:lnL>
+                    <a:lnR w="12700" cap="flat" cmpd="sng" algn="ctr">
+                      <a:solidFill>
+                        <a:schemeClr val="tx1"/>
+                      </a:solidFill>
+                      <a:prstDash val="solid"/>
+                      <a:round/>
+                      <a:headEnd type="none" w="med" len="med"/>
+                      <a:tailEnd type="none" w="med" len="med"/>
+                    </a:lnR>
+                    <a:lnT w="12700" cap="flat" cmpd="sng" algn="ctr">
+                      <a:solidFill>
+                        <a:schemeClr val="tx1"/>
+                      </a:solidFill>
+                      <a:prstDash val="solid"/>
+                      <a:round/>
+                      <a:headEnd type="none" w="med" len="med"/>
+                      <a:tailEnd type="none" w="med" len="med"/>
+                    </a:lnT>
+                    <a:lnB w="12700" cap="flat" cmpd="sng" algn="ctr">
+                      <a:solidFill>
+                        <a:schemeClr val="tx1"/>
+                      </a:solidFill>
+                      <a:prstDash val="solid"/>
+                      <a:round/>
+                      <a:headEnd type="none" w="med" len="med"/>
+                      <a:tailEnd type="none" w="med" len="med"/>
+                    </a:lnB>
+                    <a:lnTlToBr w="12700" cmpd="sng">
+                      <a:noFill/>
+                      <a:prstDash val="solid"/>
+                    </a:lnTlToBr>
+                    <a:lnBlToTr w="12700" cmpd="sng">
+                      <a:noFill/>
+                      <a:prstDash val="solid"/>
+                    </a:lnBlToTr>
+                  </a:tcPr>
+                </a:tc>
+              </a:tr>
+              <a:tr h="718962">
+                <a:tc>
+                  <a:txBody>
+                    <a:bodyPr/>
+                    <a:lstStyle/>
+                    <a:p>
+                      <a:pPr lvl="0"/>
+                      <a:r>
+                        <a:rPr lang="en-US" sz="1400" smtClean="0"/>
+                        <a:t>    </a:t>
+                      </a:r>
+                      <a:r>
+                        <a:rPr lang="en-US" sz="1400" b="1" smtClean="0"/>
+                        <a:t>C</a:t>
+                      </a:r>
+                      <a:endParaRPr lang="en-US" sz="1400" b="1" dirty="0"/>
+                    </a:p>
+                  </a:txBody>
+                  <a:tcPr anchor="ctr">
+                    <a:lnL w="12700" cap="flat" cmpd="sng" algn="ctr">
+                      <a:solidFill>
+                        <a:schemeClr val="tx1"/>
+                      </a:solidFill>
+                      <a:prstDash val="solid"/>
+                      <a:round/>
+                      <a:headEnd type="none" w="med" len="med"/>
+                      <a:tailEnd type="none" w="med" len="med"/>
+                    </a:lnL>
+                    <a:lnR w="12700" cap="flat" cmpd="sng" algn="ctr">
+                      <a:solidFill>
+                        <a:schemeClr val="tx1"/>
+                      </a:solidFill>
+                      <a:prstDash val="solid"/>
+                      <a:round/>
+                      <a:headEnd type="none" w="med" len="med"/>
+                      <a:tailEnd type="none" w="med" len="med"/>
+                    </a:lnR>
+                    <a:lnT w="12700" cap="flat" cmpd="sng" algn="ctr">
+                      <a:solidFill>
+                        <a:schemeClr val="tx1"/>
+                      </a:solidFill>
+                      <a:prstDash val="solid"/>
+                      <a:round/>
+                      <a:headEnd type="none" w="med" len="med"/>
+                      <a:tailEnd type="none" w="med" len="med"/>
+                    </a:lnT>
+                    <a:lnB w="12700" cap="flat" cmpd="sng" algn="ctr">
+                      <a:solidFill>
+                        <a:schemeClr val="tx1"/>
+                      </a:solidFill>
+                      <a:prstDash val="solid"/>
+                      <a:round/>
+                      <a:headEnd type="none" w="med" len="med"/>
+                      <a:tailEnd type="none" w="med" len="med"/>
+                    </a:lnB>
+                    <a:lnTlToBr w="12700" cmpd="sng">
+                      <a:noFill/>
+                      <a:prstDash val="solid"/>
+                    </a:lnTlToBr>
+                    <a:lnBlToTr w="12700" cmpd="sng">
+                      <a:noFill/>
+                      <a:prstDash val="solid"/>
+                    </a:lnBlToTr>
+                  </a:tcPr>
+                </a:tc>
+                <a:tc>
+                  <a:txBody>
+                    <a:bodyPr/>
+                    <a:lstStyle/>
+                    <a:p>
+                      <a:pPr marL="0" marR="0" lvl="0" indent="0" algn="l" defTabSz="914400" rtl="0" eaLnBrk="1" fontAlgn="auto" latinLnBrk="0" hangingPunct="1">
+                        <a:lnSpc>
+                          <a:spcPct val="100000"/>
+                        </a:lnSpc>
+                        <a:spcBef>
+                          <a:spcPts val="0"/>
+                        </a:spcBef>
+                        <a:spcAft>
+                          <a:spcPts val="0"/>
+                        </a:spcAft>
+                        <a:buClrTx/>
+                        <a:buSzTx/>
+                        <a:buFontTx/>
+                        <a:buNone/>
+                        <a:tabLst/>
+                        <a:defRPr/>
+                      </a:pPr>
+                      <a:r>
+                        <a:rPr lang="en-US" sz="1400" dirty="0" smtClean="0"/>
+                        <a:t>Channel</a:t>
+                      </a:r>
+                      <a:endParaRPr lang="en-US" sz="1400" dirty="0" smtClean="0"/>
+                    </a:p>
+                  </a:txBody>
+                  <a:tcPr anchor="ctr">
+                    <a:lnL w="12700" cap="flat" cmpd="sng" algn="ctr">
+                      <a:solidFill>
+                        <a:schemeClr val="tx1"/>
+                      </a:solidFill>
+                      <a:prstDash val="solid"/>
+                      <a:round/>
+                      <a:headEnd type="none" w="med" len="med"/>
+                      <a:tailEnd type="none" w="med" len="med"/>
+                    </a:lnL>
+                    <a:lnR w="12700" cap="flat" cmpd="sng" algn="ctr">
+                      <a:solidFill>
+                        <a:schemeClr val="tx1"/>
+                      </a:solidFill>
+                      <a:prstDash val="solid"/>
+                      <a:round/>
+                      <a:headEnd type="none" w="med" len="med"/>
+                      <a:tailEnd type="none" w="med" len="med"/>
+                    </a:lnR>
+                    <a:lnT w="12700" cap="flat" cmpd="sng" algn="ctr">
+                      <a:solidFill>
+                        <a:schemeClr val="tx1"/>
+                      </a:solidFill>
+                      <a:prstDash val="solid"/>
+                      <a:round/>
+                      <a:headEnd type="none" w="med" len="med"/>
+                      <a:tailEnd type="none" w="med" len="med"/>
+                    </a:lnT>
+                    <a:lnB w="12700" cap="flat" cmpd="sng" algn="ctr">
+                      <a:solidFill>
+                        <a:schemeClr val="tx1"/>
+                      </a:solidFill>
+                      <a:prstDash val="solid"/>
+                      <a:round/>
+                      <a:headEnd type="none" w="med" len="med"/>
+                      <a:tailEnd type="none" w="med" len="med"/>
+                    </a:lnB>
+                    <a:lnTlToBr w="12700" cmpd="sng">
+                      <a:noFill/>
+                      <a:prstDash val="solid"/>
+                    </a:lnTlToBr>
+                    <a:lnBlToTr w="12700" cmpd="sng">
+                      <a:noFill/>
+                      <a:prstDash val="solid"/>
+                    </a:lnBlToTr>
+                  </a:tcPr>
+                </a:tc>
+                <a:tc>
+                  <a:txBody>
+                    <a:bodyPr/>
+                    <a:lstStyle/>
+                    <a:p>
+                      <a:pPr marL="0" marR="0" lvl="0" indent="0" algn="l" defTabSz="914400" rtl="0" eaLnBrk="1" fontAlgn="auto" latinLnBrk="0" hangingPunct="1">
+                        <a:lnSpc>
+                          <a:spcPct val="100000"/>
+                        </a:lnSpc>
+                        <a:spcBef>
+                          <a:spcPts val="0"/>
+                        </a:spcBef>
+                        <a:spcAft>
+                          <a:spcPts val="0"/>
+                        </a:spcAft>
+                        <a:buClrTx/>
+                        <a:buSzTx/>
+                        <a:buFontTx/>
+                        <a:buNone/>
+                        <a:tabLst/>
+                        <a:defRPr/>
+                      </a:pPr>
+                      <a:endParaRPr lang="en-US" sz="1400" dirty="0" smtClean="0"/>
+                    </a:p>
+                  </a:txBody>
+                  <a:tcPr anchor="ctr">
+                    <a:lnL w="12700" cap="flat" cmpd="sng" algn="ctr">
+                      <a:solidFill>
+                        <a:schemeClr val="tx1"/>
+                      </a:solidFill>
+                      <a:prstDash val="solid"/>
+                      <a:round/>
+                      <a:headEnd type="none" w="med" len="med"/>
+                      <a:tailEnd type="none" w="med" len="med"/>
+                    </a:lnL>
+                    <a:lnR w="12700" cap="flat" cmpd="sng" algn="ctr">
+                      <a:solidFill>
+                        <a:schemeClr val="tx1"/>
+                      </a:solidFill>
+                      <a:prstDash val="solid"/>
+                      <a:round/>
+                      <a:headEnd type="none" w="med" len="med"/>
+                      <a:tailEnd type="none" w="med" len="med"/>
+                    </a:lnR>
+                    <a:lnT w="12700" cap="flat" cmpd="sng" algn="ctr">
+                      <a:solidFill>
+                        <a:schemeClr val="tx1"/>
+                      </a:solidFill>
+                      <a:prstDash val="solid"/>
+                      <a:round/>
+                      <a:headEnd type="none" w="med" len="med"/>
+                      <a:tailEnd type="none" w="med" len="med"/>
+                    </a:lnT>
+                    <a:lnB w="12700" cap="flat" cmpd="sng" algn="ctr">
+                      <a:solidFill>
+                        <a:schemeClr val="tx1"/>
+                      </a:solidFill>
+                      <a:prstDash val="solid"/>
+                      <a:round/>
+                      <a:headEnd type="none" w="med" len="med"/>
+                      <a:tailEnd type="none" w="med" len="med"/>
+                    </a:lnB>
+                    <a:lnTlToBr w="12700" cmpd="sng">
+                      <a:noFill/>
+                      <a:prstDash val="solid"/>
+                    </a:lnTlToBr>
+                    <a:lnBlToTr w="12700" cmpd="sng">
+                      <a:noFill/>
+                      <a:prstDash val="solid"/>
+                    </a:lnBlToTr>
+                  </a:tcPr>
+                </a:tc>
+                <a:tc>
+                  <a:txBody>
+                    <a:bodyPr/>
+                    <a:lstStyle/>
+                    <a:p>
+                      <a:pPr marL="0" marR="0" lvl="0" indent="0" algn="l" defTabSz="914400" rtl="0" eaLnBrk="1" fontAlgn="auto" latinLnBrk="0" hangingPunct="1">
+                        <a:lnSpc>
+                          <a:spcPct val="100000"/>
+                        </a:lnSpc>
+                        <a:spcBef>
+                          <a:spcPts val="0"/>
+                        </a:spcBef>
+                        <a:spcAft>
+                          <a:spcPts val="0"/>
+                        </a:spcAft>
+                        <a:buClrTx/>
+                        <a:buSzTx/>
+                        <a:buFontTx/>
+                        <a:buNone/>
+                        <a:tabLst/>
+                        <a:defRPr/>
+                      </a:pPr>
+                      <a:r>
+                        <a:rPr lang="en-US" sz="1400" dirty="0" smtClean="0"/>
+                        <a:t>Application</a:t>
+                      </a:r>
+                      <a:endParaRPr lang="en-US" sz="1400" dirty="0" smtClean="0"/>
+                    </a:p>
+                  </a:txBody>
+                  <a:tcPr anchor="ctr">
+                    <a:lnL w="12700" cap="flat" cmpd="sng" algn="ctr">
+                      <a:solidFill>
+                        <a:schemeClr val="tx1"/>
+                      </a:solidFill>
+                      <a:prstDash val="solid"/>
+                      <a:round/>
+                      <a:headEnd type="none" w="med" len="med"/>
+                      <a:tailEnd type="none" w="med" len="med"/>
+                    </a:lnL>
+                    <a:lnR w="12700" cap="flat" cmpd="sng" algn="ctr">
+                      <a:solidFill>
+                        <a:schemeClr val="tx1"/>
+                      </a:solidFill>
+                      <a:prstDash val="solid"/>
+                      <a:round/>
+                      <a:headEnd type="none" w="med" len="med"/>
+                      <a:tailEnd type="none" w="med" len="med"/>
+                    </a:lnR>
+                    <a:lnT w="12700" cap="flat" cmpd="sng" algn="ctr">
+                      <a:solidFill>
+                        <a:schemeClr val="tx1"/>
+                      </a:solidFill>
+                      <a:prstDash val="solid"/>
+                      <a:round/>
+                      <a:headEnd type="none" w="med" len="med"/>
+                      <a:tailEnd type="none" w="med" len="med"/>
+                    </a:lnT>
+                    <a:lnB w="12700" cap="flat" cmpd="sng" algn="ctr">
+                      <a:solidFill>
+                        <a:schemeClr val="tx1"/>
+                      </a:solidFill>
+                      <a:prstDash val="solid"/>
+                      <a:round/>
+                      <a:headEnd type="none" w="med" len="med"/>
+                      <a:tailEnd type="none" w="med" len="med"/>
+                    </a:lnB>
+                    <a:lnTlToBr w="12700" cmpd="sng">
+                      <a:noFill/>
+                      <a:prstDash val="solid"/>
+                    </a:lnTlToBr>
+                    <a:lnBlToTr w="12700" cmpd="sng">
+                      <a:noFill/>
+                      <a:prstDash val="solid"/>
+                    </a:lnBlToTr>
+                  </a:tcPr>
+                </a:tc>
+              </a:tr>
+              <a:tr h="718962">
+                <a:tc>
+                  <a:txBody>
+                    <a:bodyPr/>
+                    <a:lstStyle/>
+                    <a:p>
+                      <a:pPr marL="0" marR="0" lvl="0" indent="0" algn="l" defTabSz="914400" rtl="0" eaLnBrk="1" fontAlgn="auto" latinLnBrk="0" hangingPunct="1">
+                        <a:lnSpc>
+                          <a:spcPct val="100000"/>
+                        </a:lnSpc>
+                        <a:spcBef>
+                          <a:spcPts val="0"/>
+                        </a:spcBef>
+                        <a:spcAft>
+                          <a:spcPts val="0"/>
+                        </a:spcAft>
+                        <a:buClrTx/>
+                        <a:buSzTx/>
+                        <a:buFontTx/>
+                        <a:buNone/>
+                        <a:tabLst/>
+                        <a:defRPr/>
+                      </a:pPr>
+                      <a:endParaRPr lang="en-US" sz="1400" dirty="0" smtClean="0"/>
+                    </a:p>
+                  </a:txBody>
+                  <a:tcPr anchor="ctr">
+                    <a:lnL w="12700" cap="flat" cmpd="sng" algn="ctr">
+                      <a:solidFill>
+                        <a:schemeClr val="tx1"/>
+                      </a:solidFill>
+                      <a:prstDash val="solid"/>
+                      <a:round/>
+                      <a:headEnd type="none" w="med" len="med"/>
+                      <a:tailEnd type="none" w="med" len="med"/>
+                    </a:lnL>
+                    <a:lnR w="12700" cap="flat" cmpd="sng" algn="ctr">
+                      <a:solidFill>
+                        <a:schemeClr val="tx1"/>
+                      </a:solidFill>
+                      <a:prstDash val="solid"/>
+                      <a:round/>
+                      <a:headEnd type="none" w="med" len="med"/>
+                      <a:tailEnd type="none" w="med" len="med"/>
+                    </a:lnR>
+                    <a:lnT w="12700" cap="flat" cmpd="sng" algn="ctr">
+                      <a:solidFill>
+                        <a:schemeClr val="tx1"/>
+                      </a:solidFill>
+                      <a:prstDash val="solid"/>
+                      <a:round/>
+                      <a:headEnd type="none" w="med" len="med"/>
+                      <a:tailEnd type="none" w="med" len="med"/>
+                    </a:lnT>
+                    <a:lnB w="12700" cap="flat" cmpd="sng" algn="ctr">
+                      <a:solidFill>
+                        <a:schemeClr val="tx1"/>
+                      </a:solidFill>
+                      <a:prstDash val="solid"/>
+                      <a:round/>
+                      <a:headEnd type="none" w="med" len="med"/>
+                      <a:tailEnd type="none" w="med" len="med"/>
+                    </a:lnB>
+                    <a:lnTlToBr w="12700" cmpd="sng">
+                      <a:noFill/>
+                      <a:prstDash val="solid"/>
+                    </a:lnTlToBr>
+                    <a:lnBlToTr w="12700" cmpd="sng">
+                      <a:noFill/>
+                      <a:prstDash val="solid"/>
+                    </a:lnBlToTr>
+                  </a:tcPr>
+                </a:tc>
+                <a:tc>
+                  <a:txBody>
+                    <a:bodyPr/>
+                    <a:lstStyle/>
+                    <a:p>
+                      <a:pPr marL="0" marR="0" lvl="0" indent="0" algn="l" defTabSz="914400" rtl="0" eaLnBrk="1" fontAlgn="auto" latinLnBrk="0" hangingPunct="1">
+                        <a:lnSpc>
+                          <a:spcPct val="100000"/>
+                        </a:lnSpc>
+                        <a:spcBef>
+                          <a:spcPts val="0"/>
+                        </a:spcBef>
+                        <a:spcAft>
+                          <a:spcPts val="0"/>
+                        </a:spcAft>
+                        <a:buClrTx/>
+                        <a:buSzTx/>
+                        <a:buFontTx/>
+                        <a:buNone/>
+                        <a:tabLst/>
+                        <a:defRPr/>
+                      </a:pPr>
+                      <a:r>
+                        <a:rPr lang="en-US" sz="1400" dirty="0" smtClean="0"/>
+                        <a:t>Peer</a:t>
+                      </a:r>
+                    </a:p>
+                  </a:txBody>
+                  <a:tcPr anchor="ctr">
+                    <a:lnL w="12700" cap="flat" cmpd="sng" algn="ctr">
+                      <a:solidFill>
+                        <a:schemeClr val="tx1"/>
+                      </a:solidFill>
+                      <a:prstDash val="solid"/>
+                      <a:round/>
+                      <a:headEnd type="none" w="med" len="med"/>
+                      <a:tailEnd type="none" w="med" len="med"/>
+                    </a:lnL>
+                    <a:lnR w="12700" cap="flat" cmpd="sng" algn="ctr">
+                      <a:solidFill>
+                        <a:schemeClr val="tx1"/>
+                      </a:solidFill>
+                      <a:prstDash val="solid"/>
+                      <a:round/>
+                      <a:headEnd type="none" w="med" len="med"/>
+                      <a:tailEnd type="none" w="med" len="med"/>
+                    </a:lnR>
+                    <a:lnT w="12700" cap="flat" cmpd="sng" algn="ctr">
+                      <a:solidFill>
+                        <a:schemeClr val="tx1"/>
+                      </a:solidFill>
+                      <a:prstDash val="solid"/>
+                      <a:round/>
+                      <a:headEnd type="none" w="med" len="med"/>
+                      <a:tailEnd type="none" w="med" len="med"/>
+                    </a:lnT>
+                    <a:lnB w="12700" cap="flat" cmpd="sng" algn="ctr">
+                      <a:solidFill>
+                        <a:schemeClr val="tx1"/>
+                      </a:solidFill>
+                      <a:prstDash val="solid"/>
+                      <a:round/>
+                      <a:headEnd type="none" w="med" len="med"/>
+                      <a:tailEnd type="none" w="med" len="med"/>
+                    </a:lnB>
+                    <a:lnTlToBr w="12700" cmpd="sng">
+                      <a:noFill/>
+                      <a:prstDash val="solid"/>
+                    </a:lnTlToBr>
+                    <a:lnBlToTr w="12700" cmpd="sng">
+                      <a:noFill/>
+                      <a:prstDash val="solid"/>
+                    </a:lnBlToTr>
+                  </a:tcPr>
+                </a:tc>
+                <a:tc>
+                  <a:txBody>
+                    <a:bodyPr/>
+                    <a:lstStyle/>
+                    <a:p>
+                      <a:pPr marL="0" marR="0" lvl="0" indent="0" algn="l" defTabSz="914400" rtl="0" eaLnBrk="1" fontAlgn="auto" latinLnBrk="0" hangingPunct="1">
+                        <a:lnSpc>
+                          <a:spcPct val="100000"/>
+                        </a:lnSpc>
+                        <a:spcBef>
+                          <a:spcPts val="0"/>
+                        </a:spcBef>
+                        <a:spcAft>
+                          <a:spcPts val="0"/>
+                        </a:spcAft>
+                        <a:buClrTx/>
+                        <a:buSzTx/>
+                        <a:buFontTx/>
+                        <a:buNone/>
+                        <a:tabLst/>
+                        <a:defRPr/>
+                      </a:pPr>
+                      <a:endParaRPr lang="en-US" sz="1400" dirty="0" smtClean="0"/>
+                    </a:p>
+                  </a:txBody>
+                  <a:tcPr anchor="ctr">
+                    <a:lnL w="12700" cap="flat" cmpd="sng" algn="ctr">
+                      <a:solidFill>
+                        <a:schemeClr val="tx1"/>
+                      </a:solidFill>
+                      <a:prstDash val="solid"/>
+                      <a:round/>
+                      <a:headEnd type="none" w="med" len="med"/>
+                      <a:tailEnd type="none" w="med" len="med"/>
+                    </a:lnL>
+                    <a:lnR w="12700" cap="flat" cmpd="sng" algn="ctr">
+                      <a:solidFill>
+                        <a:schemeClr val="tx1"/>
+                      </a:solidFill>
+                      <a:prstDash val="solid"/>
+                      <a:round/>
+                      <a:headEnd type="none" w="med" len="med"/>
+                      <a:tailEnd type="none" w="med" len="med"/>
+                    </a:lnR>
+                    <a:lnT w="12700" cap="flat" cmpd="sng" algn="ctr">
+                      <a:solidFill>
+                        <a:schemeClr val="tx1"/>
+                      </a:solidFill>
+                      <a:prstDash val="solid"/>
+                      <a:round/>
+                      <a:headEnd type="none" w="med" len="med"/>
+                      <a:tailEnd type="none" w="med" len="med"/>
+                    </a:lnT>
+                    <a:lnB w="12700" cap="flat" cmpd="sng" algn="ctr">
+                      <a:solidFill>
+                        <a:schemeClr val="tx1"/>
+                      </a:solidFill>
+                      <a:prstDash val="solid"/>
+                      <a:round/>
+                      <a:headEnd type="none" w="med" len="med"/>
+                      <a:tailEnd type="none" w="med" len="med"/>
+                    </a:lnB>
+                    <a:lnTlToBr w="12700" cmpd="sng">
+                      <a:noFill/>
+                      <a:prstDash val="solid"/>
+                    </a:lnTlToBr>
+                    <a:lnBlToTr w="12700" cmpd="sng">
+                      <a:noFill/>
+                      <a:prstDash val="solid"/>
+                    </a:lnBlToTr>
+                  </a:tcPr>
+                </a:tc>
+                <a:tc>
+                  <a:txBody>
+                    <a:bodyPr/>
+                    <a:lstStyle/>
+                    <a:p>
+                      <a:pPr marL="0" marR="0" lvl="0" indent="0" algn="l" defTabSz="914400" rtl="0" eaLnBrk="1" fontAlgn="auto" latinLnBrk="0" hangingPunct="1">
+                        <a:lnSpc>
+                          <a:spcPct val="100000"/>
+                        </a:lnSpc>
+                        <a:spcBef>
+                          <a:spcPts val="0"/>
+                        </a:spcBef>
+                        <a:spcAft>
+                          <a:spcPts val="0"/>
+                        </a:spcAft>
+                        <a:buClrTx/>
+                        <a:buSzTx/>
+                        <a:buFontTx/>
+                        <a:buNone/>
+                        <a:tabLst/>
+                        <a:defRPr/>
+                      </a:pPr>
+                      <a:r>
+                        <a:rPr lang="en-US" sz="1400" dirty="0" smtClean="0"/>
+                        <a:t>Ledger</a:t>
+                      </a:r>
+                    </a:p>
+                  </a:txBody>
+                  <a:tcPr anchor="ctr">
+                    <a:lnL w="12700" cap="flat" cmpd="sng" algn="ctr">
+                      <a:solidFill>
+                        <a:schemeClr val="tx1"/>
+                      </a:solidFill>
+                      <a:prstDash val="solid"/>
+                      <a:round/>
+                      <a:headEnd type="none" w="med" len="med"/>
+                      <a:tailEnd type="none" w="med" len="med"/>
+                    </a:lnL>
+                    <a:lnR w="12700" cap="flat" cmpd="sng" algn="ctr">
+                      <a:solidFill>
+                        <a:schemeClr val="tx1"/>
+                      </a:solidFill>
+                      <a:prstDash val="solid"/>
+                      <a:round/>
+                      <a:headEnd type="none" w="med" len="med"/>
+                      <a:tailEnd type="none" w="med" len="med"/>
+                    </a:lnR>
+                    <a:lnT w="12700" cap="flat" cmpd="sng" algn="ctr">
+                      <a:solidFill>
+                        <a:schemeClr val="tx1"/>
+                      </a:solidFill>
+                      <a:prstDash val="solid"/>
+                      <a:round/>
+                      <a:headEnd type="none" w="med" len="med"/>
+                      <a:tailEnd type="none" w="med" len="med"/>
+                    </a:lnT>
+                    <a:lnB w="12700" cap="flat" cmpd="sng" algn="ctr">
+                      <a:solidFill>
+                        <a:schemeClr val="tx1"/>
+                      </a:solidFill>
+                      <a:prstDash val="solid"/>
+                      <a:round/>
+                      <a:headEnd type="none" w="med" len="med"/>
+                      <a:tailEnd type="none" w="med" len="med"/>
+                    </a:lnB>
+                    <a:lnTlToBr w="12700" cmpd="sng">
+                      <a:noFill/>
+                      <a:prstDash val="solid"/>
+                    </a:lnTlToBr>
+                    <a:lnBlToTr w="12700" cmpd="sng">
+                      <a:noFill/>
+                      <a:prstDash val="solid"/>
+                    </a:lnBlToTr>
+                  </a:tcPr>
+                </a:tc>
+              </a:tr>
+            </a:tbl>
+          </a:graphicData>
+        </a:graphic>
+      </p:graphicFrame>
+      <p:sp>
+        <p:nvSpPr>
+          <p:cNvPr id="55" name="Document 54"/>
+          <p:cNvSpPr/>
+          <p:nvPr/>
+        </p:nvSpPr>
+        <p:spPr>
+          <a:xfrm>
+            <a:off x="9560321" y="4264924"/>
+            <a:ext cx="523020" cy="414227"/>
+          </a:xfrm>
+          <a:prstGeom prst="flowChartDocument">
+            <a:avLst/>
+          </a:prstGeom>
+          <a:solidFill>
+            <a:srgbClr val="FF0000"/>
+          </a:solidFill>
+          <a:ln w="19050">
+            <a:solidFill>
+              <a:srgbClr val="0070C0"/>
+            </a:solidFill>
+          </a:ln>
+        </p:spPr>
+        <p:style>
+          <a:lnRef idx="2">
+            <a:schemeClr val="accent1">
+              <a:shade val="50000"/>
+            </a:schemeClr>
+          </a:lnRef>
+          <a:fillRef idx="1">
+            <a:schemeClr val="accent1"/>
+          </a:fillRef>
+          <a:effectRef idx="0">
+            <a:schemeClr val="accent1"/>
+          </a:effectRef>
+          <a:fontRef idx="minor">
+            <a:schemeClr val="lt1"/>
+          </a:fontRef>
+        </p:style>
+        <p:txBody>
+          <a:bodyPr rtlCol="0" anchor="ctr"/>
+          <a:lstStyle/>
+          <a:p>
+            <a:pPr algn="ctr" defTabSz="457200"/>
+            <a:r>
+              <a:rPr lang="en-US" sz="1400" b="1" dirty="0" smtClean="0">
+                <a:solidFill>
+                  <a:srgbClr val="000000"/>
+                </a:solidFill>
+              </a:rPr>
+              <a:t>L</a:t>
+            </a:r>
+            <a:endParaRPr lang="en-US" sz="1400" b="1" dirty="0">
+              <a:solidFill>
+                <a:srgbClr val="000000"/>
+              </a:solidFill>
+            </a:endParaRPr>
+          </a:p>
+        </p:txBody>
+      </p:sp>
+      <p:sp>
+        <p:nvSpPr>
+          <p:cNvPr id="61" name="Rounded Rectangle 60"/>
+          <p:cNvSpPr/>
+          <p:nvPr/>
+        </p:nvSpPr>
+        <p:spPr>
+          <a:xfrm>
+            <a:off x="7277297" y="2771038"/>
+            <a:ext cx="470643" cy="431746"/>
+          </a:xfrm>
+          <a:prstGeom prst="roundRect">
+            <a:avLst/>
+          </a:prstGeom>
+          <a:solidFill>
+            <a:schemeClr val="accent1">
+              <a:lumMod val="20000"/>
+              <a:lumOff val="80000"/>
+            </a:schemeClr>
+          </a:solidFill>
+          <a:ln w="19050">
+            <a:solidFill>
+              <a:srgbClr val="0070C0"/>
+            </a:solidFill>
+          </a:ln>
+        </p:spPr>
+        <p:style>
+          <a:lnRef idx="2">
+            <a:schemeClr val="accent1">
+              <a:shade val="50000"/>
+            </a:schemeClr>
+          </a:lnRef>
+          <a:fillRef idx="1">
+            <a:schemeClr val="accent1"/>
+          </a:fillRef>
+          <a:effectRef idx="0">
+            <a:schemeClr val="accent1"/>
+          </a:effectRef>
+          <a:fontRef idx="minor">
+            <a:schemeClr val="lt1"/>
+          </a:fontRef>
+        </p:style>
+        <p:txBody>
+          <a:bodyPr rtlCol="0" anchor="ctr"/>
+          <a:lstStyle/>
+          <a:p>
+            <a:pPr algn="ctr" defTabSz="457200"/>
+            <a:r>
+              <a:rPr lang="en-US" sz="1400" b="1" dirty="0" smtClean="0">
+                <a:solidFill>
+                  <a:srgbClr val="000000"/>
+                </a:solidFill>
+                <a:ea typeface="Arial" charset="0"/>
+                <a:cs typeface="Arial" charset="0"/>
+              </a:rPr>
+              <a:t>N</a:t>
+            </a:r>
+            <a:endParaRPr lang="en-US" sz="1600" b="1" dirty="0">
+              <a:solidFill>
+                <a:srgbClr val="000000"/>
+              </a:solidFill>
+              <a:ea typeface="Arial" charset="0"/>
+              <a:cs typeface="Arial" charset="0"/>
+            </a:endParaRPr>
+          </a:p>
+        </p:txBody>
+      </p:sp>
+      <p:sp>
+        <p:nvSpPr>
+          <p:cNvPr id="62" name="Rounded Rectangle 61"/>
+          <p:cNvSpPr/>
+          <p:nvPr/>
+        </p:nvSpPr>
+        <p:spPr>
+          <a:xfrm>
+            <a:off x="9581237" y="2769744"/>
+            <a:ext cx="481189" cy="444147"/>
+          </a:xfrm>
+          <a:prstGeom prst="roundRect">
+            <a:avLst/>
+          </a:prstGeom>
+          <a:solidFill>
+            <a:srgbClr val="FFC000"/>
+          </a:solidFill>
+          <a:ln w="19050" cmpd="sng">
+            <a:solidFill>
+              <a:srgbClr val="0070C0"/>
+            </a:solidFill>
+          </a:ln>
+          <a:effectLst/>
+        </p:spPr>
+        <p:style>
+          <a:lnRef idx="1">
+            <a:schemeClr val="accent1"/>
+          </a:lnRef>
+          <a:fillRef idx="3">
+            <a:schemeClr val="accent1"/>
+          </a:fillRef>
+          <a:effectRef idx="2">
+            <a:schemeClr val="accent1"/>
+          </a:effectRef>
+          <a:fontRef idx="minor">
+            <a:schemeClr val="lt1"/>
+          </a:fontRef>
+        </p:style>
+        <p:txBody>
+          <a:bodyPr rtlCol="0" anchor="ctr"/>
+          <a:lstStyle/>
+          <a:p>
+            <a:pPr algn="ctr" defTabSz="457200"/>
+            <a:r>
+              <a:rPr lang="en-US" sz="1400" b="1" dirty="0" smtClean="0">
+                <a:solidFill>
+                  <a:srgbClr val="000000"/>
+                </a:solidFill>
+                <a:ea typeface="Arial" charset="0"/>
+                <a:cs typeface="Arial" charset="0"/>
+              </a:rPr>
+              <a:t>S</a:t>
+            </a:r>
+            <a:endParaRPr lang="en-US" sz="1400" b="1" dirty="0">
+              <a:solidFill>
+                <a:srgbClr val="000000"/>
+              </a:solidFill>
+              <a:ea typeface="Arial" charset="0"/>
+              <a:cs typeface="Arial" charset="0"/>
+            </a:endParaRPr>
+          </a:p>
+        </p:txBody>
+      </p:sp>
+      <p:sp>
+        <p:nvSpPr>
+          <p:cNvPr id="63" name="Rounded Rectangle 62"/>
+          <p:cNvSpPr/>
+          <p:nvPr/>
+        </p:nvSpPr>
+        <p:spPr>
+          <a:xfrm>
+            <a:off x="7277297" y="4235004"/>
+            <a:ext cx="481189" cy="444147"/>
+          </a:xfrm>
+          <a:prstGeom prst="roundRect">
+            <a:avLst/>
+          </a:prstGeom>
+          <a:solidFill>
+            <a:schemeClr val="accent1"/>
+          </a:solidFill>
+          <a:ln w="19050" cmpd="sng">
+            <a:solidFill>
+              <a:schemeClr val="tx2"/>
+            </a:solidFill>
+          </a:ln>
+          <a:effectLst/>
+        </p:spPr>
+        <p:style>
+          <a:lnRef idx="1">
+            <a:schemeClr val="accent1"/>
+          </a:lnRef>
+          <a:fillRef idx="3">
+            <a:schemeClr val="accent1"/>
+          </a:fillRef>
+          <a:effectRef idx="2">
+            <a:schemeClr val="accent1"/>
+          </a:effectRef>
+          <a:fontRef idx="minor">
+            <a:schemeClr val="lt1"/>
+          </a:fontRef>
+        </p:style>
+        <p:txBody>
+          <a:bodyPr rtlCol="0" anchor="ctr"/>
+          <a:lstStyle/>
+          <a:p>
+            <a:pPr algn="ctr" defTabSz="457200"/>
+            <a:r>
+              <a:rPr lang="en-US" sz="1400" b="1" dirty="0">
+                <a:solidFill>
+                  <a:schemeClr val="bg1"/>
+                </a:solidFill>
+                <a:ea typeface="Arial" charset="0"/>
+                <a:cs typeface="Arial" charset="0"/>
+              </a:rPr>
+              <a:t>P</a:t>
+            </a:r>
+          </a:p>
+        </p:txBody>
+      </p:sp>
+      <p:sp>
+        <p:nvSpPr>
+          <p:cNvPr id="64" name="Oval 63"/>
+          <p:cNvSpPr/>
+          <p:nvPr/>
+        </p:nvSpPr>
+        <p:spPr>
+          <a:xfrm>
+            <a:off x="7256346" y="3627780"/>
+            <a:ext cx="526249" cy="238539"/>
+          </a:xfrm>
+          <a:prstGeom prst="ellipse">
+            <a:avLst/>
+          </a:prstGeom>
+          <a:noFill/>
+          <a:ln w="38100">
+            <a:solidFill>
+              <a:srgbClr val="4372C4"/>
+            </a:solidFill>
+          </a:ln>
+          <a:effectLst>
+            <a:outerShdw blurRad="50800" dist="38100" dir="2700000" algn="tl" rotWithShape="0">
+              <a:prstClr val="black">
+                <a:alpha val="40000"/>
+              </a:prstClr>
+            </a:outerShdw>
+          </a:effectLst>
+        </p:spPr>
+        <p:style>
+          <a:lnRef idx="2">
+            <a:schemeClr val="accent1">
+              <a:shade val="50000"/>
+            </a:schemeClr>
+          </a:lnRef>
+          <a:fillRef idx="1">
+            <a:schemeClr val="accent1"/>
+          </a:fillRef>
+          <a:effectRef idx="0">
+            <a:schemeClr val="accent1"/>
+          </a:effectRef>
+          <a:fontRef idx="minor">
+            <a:schemeClr val="lt1"/>
+          </a:fontRef>
+        </p:style>
+        <p:txBody>
+          <a:bodyPr rtlCol="0" anchor="ctr"/>
+          <a:lstStyle/>
+          <a:p>
+            <a:pPr algn="ctr"/>
+            <a:endParaRPr lang="en-US"/>
+          </a:p>
+        </p:txBody>
+      </p:sp>
+      <p:grpSp>
+        <p:nvGrpSpPr>
+          <p:cNvPr id="3" name="Group 2"/>
+          <p:cNvGrpSpPr/>
+          <p:nvPr/>
+        </p:nvGrpSpPr>
+        <p:grpSpPr>
+          <a:xfrm>
+            <a:off x="4070281" y="3526560"/>
+            <a:ext cx="1290320" cy="1021044"/>
+            <a:chOff x="4341185" y="3078579"/>
+            <a:chExt cx="1290320" cy="1021044"/>
+          </a:xfrm>
+        </p:grpSpPr>
+        <p:sp>
+          <p:nvSpPr>
+            <p:cNvPr id="27" name="Rounded Rectangle 26"/>
+            <p:cNvSpPr/>
+            <p:nvPr/>
+          </p:nvSpPr>
+          <p:spPr>
+            <a:xfrm>
+              <a:off x="4698468" y="3545053"/>
+              <a:ext cx="559591" cy="554570"/>
+            </a:xfrm>
+            <a:prstGeom prst="roundRect">
+              <a:avLst/>
+            </a:prstGeom>
+            <a:solidFill>
+              <a:srgbClr val="4372C4"/>
+            </a:solidFill>
+            <a:ln w="28575" cap="flat" cmpd="sng" algn="ctr">
+              <a:solidFill>
+                <a:schemeClr val="tx2"/>
+              </a:solidFill>
+              <a:prstDash val="solid"/>
+            </a:ln>
+            <a:effectLst>
+              <a:outerShdw blurRad="40000" dist="23000" dir="5400000" rotWithShape="0">
+                <a:srgbClr val="000000">
+                  <a:alpha val="35000"/>
+                </a:srgbClr>
+              </a:outerShdw>
+            </a:effectLst>
+          </p:spPr>
+          <p:txBody>
+            <a:bodyPr tIns="36000" bIns="36000" rtlCol="0" anchor="ctr"/>
+            <a:lstStyle/>
+            <a:p>
+              <a:pPr marL="0" marR="0" lvl="0" indent="0" algn="ctr" defTabSz="457200" eaLnBrk="1" fontAlgn="auto" latinLnBrk="0" hangingPunct="1">
+                <a:lnSpc>
+                  <a:spcPct val="100000"/>
+                </a:lnSpc>
+                <a:spcBef>
+                  <a:spcPts val="0"/>
+                </a:spcBef>
+                <a:spcAft>
+                  <a:spcPts val="0"/>
+                </a:spcAft>
+                <a:buClrTx/>
+                <a:buSzTx/>
+                <a:buFontTx/>
+                <a:buNone/>
+                <a:tabLst/>
+                <a:defRPr/>
+              </a:pPr>
+              <a:r>
+                <a:rPr lang="en-US" sz="2400" b="1" kern="0" noProof="0" dirty="0" smtClean="0">
+                  <a:solidFill>
+                    <a:schemeClr val="bg1"/>
+                  </a:solidFill>
+                  <a:ea typeface=""/>
+                  <a:cs typeface=""/>
+                </a:rPr>
+                <a:t>P</a:t>
+              </a:r>
+              <a:endParaRPr kumimoji="0" lang="en-US" sz="2400" b="1" i="0" u="none" strike="noStrike" kern="0" cap="none" spc="0" normalizeH="0" baseline="0" noProof="0" dirty="0" smtClean="0">
+                <a:ln>
+                  <a:noFill/>
+                </a:ln>
+                <a:solidFill>
+                  <a:schemeClr val="bg1"/>
+                </a:solidFill>
+                <a:effectLst/>
+                <a:uLnTx/>
+                <a:uFillTx/>
+                <a:ea typeface=""/>
+                <a:cs typeface=""/>
+              </a:endParaRPr>
+            </a:p>
+          </p:txBody>
+        </p:sp>
+        <p:sp>
+          <p:nvSpPr>
+            <p:cNvPr id="44" name="Document 43"/>
+            <p:cNvSpPr/>
+            <p:nvPr/>
+          </p:nvSpPr>
+          <p:spPr>
+            <a:xfrm>
+              <a:off x="4341185" y="3353180"/>
+              <a:ext cx="547666" cy="433746"/>
+            </a:xfrm>
+            <a:prstGeom prst="flowChartDocument">
+              <a:avLst/>
+            </a:prstGeom>
+            <a:solidFill>
+              <a:srgbClr val="FF0000"/>
+            </a:solidFill>
+            <a:ln w="19050">
+              <a:solidFill>
+                <a:srgbClr val="0070C0"/>
+              </a:solidFill>
+            </a:ln>
+          </p:spPr>
+          <p:style>
+            <a:lnRef idx="2">
+              <a:schemeClr val="accent1">
+                <a:shade val="50000"/>
+              </a:schemeClr>
+            </a:lnRef>
+            <a:fillRef idx="1">
+              <a:schemeClr val="accent1"/>
+            </a:fillRef>
+            <a:effectRef idx="0">
+              <a:schemeClr val="accent1"/>
+            </a:effectRef>
+            <a:fontRef idx="minor">
+              <a:schemeClr val="lt1"/>
+            </a:fontRef>
+          </p:style>
+          <p:txBody>
+            <a:bodyPr rtlCol="0" anchor="ctr"/>
+            <a:lstStyle/>
+            <a:p>
+              <a:pPr algn="ctr"/>
+              <a:r>
+                <a:rPr lang="en-US" sz="2400" b="1" dirty="0" smtClean="0">
+                  <a:solidFill>
+                    <a:schemeClr val="bg1"/>
+                  </a:solidFill>
+                </a:rPr>
+                <a:t>L</a:t>
+              </a:r>
+              <a:endParaRPr lang="en-US" sz="2400" b="1" dirty="0">
+                <a:solidFill>
+                  <a:schemeClr val="bg1"/>
+                </a:solidFill>
+              </a:endParaRPr>
+            </a:p>
+          </p:txBody>
+        </p:sp>
+        <p:sp>
+          <p:nvSpPr>
+            <p:cNvPr id="29" name="Rounded Rectangle 28"/>
+            <p:cNvSpPr/>
+            <p:nvPr/>
+          </p:nvSpPr>
+          <p:spPr>
+            <a:xfrm>
+              <a:off x="5036501" y="3078579"/>
+              <a:ext cx="595004" cy="549201"/>
+            </a:xfrm>
+            <a:prstGeom prst="roundRect">
+              <a:avLst/>
+            </a:prstGeom>
+            <a:solidFill>
+              <a:srgbClr val="FFC000"/>
+            </a:solidFill>
+            <a:ln w="28575" cmpd="sng">
+              <a:solidFill>
+                <a:srgbClr val="0070C0"/>
+              </a:solidFill>
+            </a:ln>
+            <a:effectLst/>
+          </p:spPr>
+          <p:style>
+            <a:lnRef idx="1">
+              <a:schemeClr val="accent1"/>
+            </a:lnRef>
+            <a:fillRef idx="3">
+              <a:schemeClr val="accent1"/>
+            </a:fillRef>
+            <a:effectRef idx="2">
+              <a:schemeClr val="accent1"/>
+            </a:effectRef>
+            <a:fontRef idx="minor">
+              <a:schemeClr val="lt1"/>
+            </a:fontRef>
+          </p:style>
+          <p:txBody>
+            <a:bodyPr rtlCol="0" anchor="ctr"/>
+            <a:lstStyle/>
+            <a:p>
+              <a:pPr algn="ctr"/>
+              <a:r>
+                <a:rPr lang="en-US" sz="2400" b="1" dirty="0" smtClean="0">
+                  <a:solidFill>
+                    <a:srgbClr val="4372C4"/>
+                  </a:solidFill>
+                  <a:ea typeface="Arial" charset="0"/>
+                  <a:cs typeface="Arial" charset="0"/>
+                </a:rPr>
+                <a:t>S</a:t>
+              </a:r>
+              <a:endParaRPr lang="en-US" sz="2400" b="1" dirty="0">
+                <a:solidFill>
+                  <a:srgbClr val="4372C4"/>
+                </a:solidFill>
+                <a:ea typeface="Arial" charset="0"/>
+                <a:cs typeface="Arial" charset="0"/>
+              </a:endParaRPr>
+            </a:p>
+          </p:txBody>
+        </p:sp>
+      </p:grpSp>
+      <p:sp>
+        <p:nvSpPr>
+          <p:cNvPr id="41" name="Rounded Rectangle 40"/>
+          <p:cNvSpPr/>
+          <p:nvPr/>
+        </p:nvSpPr>
+        <p:spPr>
+          <a:xfrm>
+            <a:off x="1355517" y="3985669"/>
+            <a:ext cx="575072" cy="567368"/>
+          </a:xfrm>
+          <a:prstGeom prst="roundRect">
+            <a:avLst/>
+          </a:prstGeom>
+          <a:solidFill>
+            <a:schemeClr val="bg1"/>
+          </a:solidFill>
+          <a:ln w="25400">
+            <a:solidFill>
+              <a:srgbClr val="0070C0"/>
+            </a:solidFill>
+          </a:ln>
+        </p:spPr>
+        <p:style>
+          <a:lnRef idx="2">
+            <a:schemeClr val="accent1">
+              <a:shade val="50000"/>
+            </a:schemeClr>
+          </a:lnRef>
+          <a:fillRef idx="1">
+            <a:schemeClr val="accent1"/>
+          </a:fillRef>
+          <a:effectRef idx="0">
+            <a:schemeClr val="accent1"/>
+          </a:effectRef>
+          <a:fontRef idx="minor">
+            <a:schemeClr val="lt1"/>
+          </a:fontRef>
+        </p:style>
+        <p:txBody>
+          <a:bodyPr rtlCol="0" anchor="ctr"/>
+          <a:lstStyle/>
+          <a:p>
+            <a:pPr algn="ctr"/>
+            <a:r>
+              <a:rPr lang="en-US" sz="2000" b="1" smtClean="0">
+                <a:solidFill>
+                  <a:srgbClr val="4372C4"/>
+                </a:solidFill>
+              </a:rPr>
+              <a:t>A</a:t>
+            </a:r>
+            <a:endParaRPr lang="en-US" sz="2000" b="1" dirty="0">
+              <a:solidFill>
+                <a:srgbClr val="4372C4"/>
+              </a:solidFill>
+            </a:endParaRPr>
+          </a:p>
+        </p:txBody>
+      </p:sp>
+      <p:sp>
+        <p:nvSpPr>
+          <p:cNvPr id="42" name="Rounded Rectangle 41"/>
+          <p:cNvSpPr/>
+          <p:nvPr/>
+        </p:nvSpPr>
+        <p:spPr>
+          <a:xfrm>
+            <a:off x="9581237" y="3523534"/>
+            <a:ext cx="470643" cy="431746"/>
+          </a:xfrm>
+          <a:prstGeom prst="roundRect">
+            <a:avLst/>
+          </a:prstGeom>
+          <a:solidFill>
+            <a:schemeClr val="bg1"/>
+          </a:solidFill>
+          <a:ln w="19050">
+            <a:solidFill>
+              <a:srgbClr val="0070C0"/>
+            </a:solidFill>
+          </a:ln>
+        </p:spPr>
+        <p:style>
+          <a:lnRef idx="2">
+            <a:schemeClr val="accent1">
+              <a:shade val="50000"/>
+            </a:schemeClr>
+          </a:lnRef>
+          <a:fillRef idx="1">
+            <a:schemeClr val="accent1"/>
+          </a:fillRef>
+          <a:effectRef idx="0">
+            <a:schemeClr val="accent1"/>
+          </a:effectRef>
+          <a:fontRef idx="minor">
+            <a:schemeClr val="lt1"/>
+          </a:fontRef>
+        </p:style>
+        <p:txBody>
+          <a:bodyPr rtlCol="0" anchor="ctr"/>
+          <a:lstStyle/>
+          <a:p>
+            <a:pPr algn="ctr" defTabSz="457200"/>
+            <a:r>
+              <a:rPr lang="en-US" sz="1400" b="1" dirty="0">
+                <a:solidFill>
+                  <a:srgbClr val="4372C4"/>
+                </a:solidFill>
+                <a:ea typeface="Arial" charset="0"/>
+                <a:cs typeface="Arial" charset="0"/>
+              </a:rPr>
+              <a:t>A</a:t>
+            </a:r>
+            <a:endParaRPr lang="en-US" sz="1600" b="1" dirty="0">
+              <a:solidFill>
+                <a:srgbClr val="4372C4"/>
+              </a:solidFill>
+              <a:ea typeface="Arial" charset="0"/>
+              <a:cs typeface="Arial" charset="0"/>
+            </a:endParaRPr>
+          </a:p>
+        </p:txBody>
+      </p:sp>
+      <p:sp>
+        <p:nvSpPr>
+          <p:cNvPr id="45" name="TextBox 44"/>
+          <p:cNvSpPr txBox="1"/>
+          <p:nvPr/>
+        </p:nvSpPr>
+        <p:spPr>
+          <a:xfrm>
+            <a:off x="2938211" y="4922544"/>
+            <a:ext cx="384835" cy="461665"/>
+          </a:xfrm>
+          <a:prstGeom prst="rect">
+            <a:avLst/>
+          </a:prstGeom>
+          <a:noFill/>
+          <a:ln>
+            <a:noFill/>
+          </a:ln>
+        </p:spPr>
+        <p:txBody>
+          <a:bodyPr wrap="square" rtlCol="0">
+            <a:spAutoFit/>
+          </a:bodyPr>
+          <a:lstStyle/>
+          <a:p>
+            <a:r>
+              <a:rPr lang="en-US" sz="2400" b="1" dirty="0" smtClean="0">
+                <a:solidFill>
+                  <a:schemeClr val="accent1"/>
+                </a:solidFill>
+              </a:rPr>
+              <a:t>C</a:t>
+            </a:r>
+            <a:endParaRPr lang="en-US" sz="2400" b="1" dirty="0">
+              <a:solidFill>
+                <a:schemeClr val="accent1"/>
+              </a:solidFill>
+            </a:endParaRPr>
+          </a:p>
+        </p:txBody>
+      </p:sp>
+      <p:sp>
+        <p:nvSpPr>
+          <p:cNvPr id="50" name="Oval 49"/>
+          <p:cNvSpPr/>
+          <p:nvPr/>
+        </p:nvSpPr>
+        <p:spPr>
+          <a:xfrm>
+            <a:off x="1008587" y="4999463"/>
+            <a:ext cx="4344381" cy="307828"/>
+          </a:xfrm>
+          <a:prstGeom prst="ellipse">
+            <a:avLst/>
+          </a:prstGeom>
+          <a:noFill/>
+          <a:ln w="38100">
+            <a:solidFill>
+              <a:srgbClr val="4372C4"/>
+            </a:solidFill>
+          </a:ln>
+          <a:effectLst>
+            <a:outerShdw blurRad="50800" dist="38100" dir="2700000" algn="tl" rotWithShape="0">
+              <a:prstClr val="black">
+                <a:alpha val="40000"/>
+              </a:prstClr>
+            </a:outerShdw>
+          </a:effectLst>
+        </p:spPr>
+        <p:style>
+          <a:lnRef idx="2">
+            <a:schemeClr val="accent1">
+              <a:shade val="50000"/>
+            </a:schemeClr>
+          </a:lnRef>
+          <a:fillRef idx="1">
+            <a:schemeClr val="accent1"/>
+          </a:fillRef>
+          <a:effectRef idx="0">
+            <a:schemeClr val="accent1"/>
+          </a:effectRef>
+          <a:fontRef idx="minor">
+            <a:schemeClr val="lt1"/>
+          </a:fontRef>
+        </p:style>
+        <p:txBody>
+          <a:bodyPr rtlCol="0" anchor="ctr"/>
+          <a:lstStyle/>
+          <a:p>
+            <a:pPr algn="ctr"/>
+            <a:endParaRPr lang="en-US"/>
+          </a:p>
+        </p:txBody>
+      </p:sp>
+      <p:cxnSp>
+        <p:nvCxnSpPr>
+          <p:cNvPr id="57" name="Straight Connector 56"/>
+          <p:cNvCxnSpPr>
+            <a:stCxn id="58" idx="0"/>
+            <a:endCxn id="50" idx="1"/>
+          </p:cNvCxnSpPr>
+          <p:nvPr/>
+        </p:nvCxnSpPr>
+        <p:spPr>
+          <a:xfrm flipH="1">
+            <a:off x="1644807" y="4634038"/>
+            <a:ext cx="3054" cy="410505"/>
+          </a:xfrm>
+          <a:prstGeom prst="line">
+            <a:avLst/>
+          </a:prstGeom>
+          <a:solidFill>
+            <a:schemeClr val="accent1"/>
+          </a:solidFill>
+          <a:ln w="38100" cap="flat" cmpd="sng" algn="ctr">
+            <a:solidFill>
+              <a:schemeClr val="accent1"/>
+            </a:solidFill>
+            <a:prstDash val="solid"/>
+            <a:tailEnd type="none"/>
+          </a:ln>
+          <a:effectLst>
+            <a:outerShdw blurRad="40000" dist="20000" dir="5400000" rotWithShape="0">
+              <a:srgbClr val="000000">
+                <a:alpha val="38000"/>
+              </a:srgbClr>
+            </a:outerShdw>
+          </a:effectLst>
+        </p:spPr>
+      </p:cxnSp>
+      <p:sp>
+        <p:nvSpPr>
+          <p:cNvPr id="58" name="Oval 57"/>
+          <p:cNvSpPr/>
+          <p:nvPr/>
+        </p:nvSpPr>
+        <p:spPr>
+          <a:xfrm flipV="1">
+            <a:off x="1566860" y="4472037"/>
+            <a:ext cx="162001" cy="162001"/>
+          </a:xfrm>
+          <a:prstGeom prst="ellipse">
+            <a:avLst/>
+          </a:prstGeom>
+          <a:solidFill>
+            <a:schemeClr val="accent1"/>
+          </a:solidFill>
+          <a:ln w="25400" cmpd="sng">
+            <a:solidFill>
+              <a:schemeClr val="tx2"/>
+            </a:solidFill>
+          </a:ln>
+          <a:effectLst>
+            <a:outerShdw blurRad="50800" dist="38100" dir="2700000" algn="tl" rotWithShape="0">
+              <a:prstClr val="black">
+                <a:alpha val="40000"/>
+              </a:prstClr>
+            </a:outerShdw>
+          </a:effectLst>
+        </p:spPr>
+        <p:style>
+          <a:lnRef idx="1">
+            <a:schemeClr val="accent1"/>
+          </a:lnRef>
+          <a:fillRef idx="3">
+            <a:schemeClr val="accent1"/>
+          </a:fillRef>
+          <a:effectRef idx="2">
+            <a:schemeClr val="accent1"/>
+          </a:effectRef>
+          <a:fontRef idx="minor">
+            <a:schemeClr val="lt1"/>
+          </a:fontRef>
+        </p:style>
+        <p:txBody>
+          <a:bodyPr rtlCol="0" anchor="ctr"/>
+          <a:lstStyle/>
+          <a:p>
+            <a:pPr algn="ctr"/>
+            <a:endParaRPr lang="en-GB" sz="1000">
+              <a:solidFill>
+                <a:srgbClr val="000000"/>
+              </a:solidFill>
+            </a:endParaRPr>
+          </a:p>
+        </p:txBody>
+      </p:sp>
+      <p:cxnSp>
+        <p:nvCxnSpPr>
+          <p:cNvPr id="59" name="Straight Connector 58"/>
+          <p:cNvCxnSpPr>
+            <a:stCxn id="60" idx="0"/>
+            <a:endCxn id="50" idx="7"/>
+          </p:cNvCxnSpPr>
+          <p:nvPr/>
+        </p:nvCxnSpPr>
+        <p:spPr>
+          <a:xfrm>
+            <a:off x="4715442" y="4630056"/>
+            <a:ext cx="1306" cy="414487"/>
+          </a:xfrm>
+          <a:prstGeom prst="line">
+            <a:avLst/>
+          </a:prstGeom>
+          <a:solidFill>
+            <a:schemeClr val="accent1"/>
+          </a:solidFill>
+          <a:ln w="38100" cap="flat" cmpd="sng" algn="ctr">
+            <a:solidFill>
+              <a:schemeClr val="accent1"/>
+            </a:solidFill>
+            <a:prstDash val="solid"/>
+            <a:tailEnd type="none"/>
+          </a:ln>
+          <a:effectLst>
+            <a:outerShdw blurRad="40000" dist="20000" dir="5400000" rotWithShape="0">
+              <a:srgbClr val="000000">
+                <a:alpha val="38000"/>
+              </a:srgbClr>
+            </a:outerShdw>
+          </a:effectLst>
+        </p:spPr>
+      </p:cxnSp>
+      <p:sp>
+        <p:nvSpPr>
+          <p:cNvPr id="60" name="Oval 59"/>
+          <p:cNvSpPr/>
+          <p:nvPr/>
+        </p:nvSpPr>
+        <p:spPr>
+          <a:xfrm flipV="1">
+            <a:off x="4634441" y="4468055"/>
+            <a:ext cx="162001" cy="162001"/>
+          </a:xfrm>
+          <a:prstGeom prst="ellipse">
+            <a:avLst/>
+          </a:prstGeom>
+          <a:solidFill>
+            <a:schemeClr val="accent1"/>
+          </a:solidFill>
+          <a:ln w="25400" cmpd="sng">
+            <a:solidFill>
+              <a:schemeClr val="tx2"/>
+            </a:solidFill>
+          </a:ln>
+          <a:effectLst>
+            <a:outerShdw blurRad="50800" dist="38100" dir="2700000" algn="tl" rotWithShape="0">
+              <a:prstClr val="black">
+                <a:alpha val="40000"/>
+              </a:prstClr>
+            </a:outerShdw>
+          </a:effectLst>
+        </p:spPr>
+        <p:style>
+          <a:lnRef idx="1">
+            <a:schemeClr val="accent1"/>
+          </a:lnRef>
+          <a:fillRef idx="3">
+            <a:schemeClr val="accent1"/>
+          </a:fillRef>
+          <a:effectRef idx="2">
+            <a:schemeClr val="accent1"/>
+          </a:effectRef>
+          <a:fontRef idx="minor">
+            <a:schemeClr val="lt1"/>
+          </a:fontRef>
+        </p:style>
+        <p:txBody>
+          <a:bodyPr rtlCol="0" anchor="ctr"/>
+          <a:lstStyle/>
+          <a:p>
+            <a:pPr algn="ctr"/>
+            <a:endParaRPr lang="en-GB" sz="1000">
+              <a:solidFill>
+                <a:srgbClr val="000000"/>
+              </a:solidFill>
+            </a:endParaRPr>
+          </a:p>
+        </p:txBody>
+      </p:sp>
+      <p:grpSp>
+        <p:nvGrpSpPr>
+          <p:cNvPr id="65" name="Group 64"/>
+          <p:cNvGrpSpPr/>
+          <p:nvPr/>
+        </p:nvGrpSpPr>
+        <p:grpSpPr>
+          <a:xfrm>
+            <a:off x="2536161" y="2916570"/>
+            <a:ext cx="1290320" cy="1021044"/>
+            <a:chOff x="4341185" y="3078579"/>
+            <a:chExt cx="1290320" cy="1021044"/>
+          </a:xfrm>
+        </p:grpSpPr>
+        <p:sp>
+          <p:nvSpPr>
+            <p:cNvPr id="66" name="Rounded Rectangle 65"/>
+            <p:cNvSpPr/>
+            <p:nvPr/>
+          </p:nvSpPr>
+          <p:spPr>
+            <a:xfrm>
+              <a:off x="4698468" y="3545053"/>
+              <a:ext cx="559591" cy="554570"/>
+            </a:xfrm>
+            <a:prstGeom prst="roundRect">
+              <a:avLst/>
+            </a:prstGeom>
+            <a:solidFill>
+              <a:srgbClr val="4372C4"/>
+            </a:solidFill>
+            <a:ln w="28575" cap="flat" cmpd="sng" algn="ctr">
+              <a:solidFill>
+                <a:schemeClr val="tx2"/>
+              </a:solidFill>
+              <a:prstDash val="solid"/>
+            </a:ln>
+            <a:effectLst>
+              <a:outerShdw blurRad="40000" dist="23000" dir="5400000" rotWithShape="0">
+                <a:srgbClr val="000000">
+                  <a:alpha val="35000"/>
+                </a:srgbClr>
+              </a:outerShdw>
+            </a:effectLst>
+          </p:spPr>
+          <p:txBody>
+            <a:bodyPr tIns="36000" bIns="36000" rtlCol="0" anchor="ctr"/>
+            <a:lstStyle/>
+            <a:p>
+              <a:pPr marL="0" marR="0" lvl="0" indent="0" algn="ctr" defTabSz="457200" eaLnBrk="1" fontAlgn="auto" latinLnBrk="0" hangingPunct="1">
+                <a:lnSpc>
+                  <a:spcPct val="100000"/>
+                </a:lnSpc>
+                <a:spcBef>
+                  <a:spcPts val="0"/>
+                </a:spcBef>
+                <a:spcAft>
+                  <a:spcPts val="0"/>
+                </a:spcAft>
+                <a:buClrTx/>
+                <a:buSzTx/>
+                <a:buFontTx/>
+                <a:buNone/>
+                <a:tabLst/>
+                <a:defRPr/>
+              </a:pPr>
+              <a:r>
+                <a:rPr lang="en-US" sz="2400" b="1" kern="0" noProof="0" dirty="0" smtClean="0">
+                  <a:solidFill>
+                    <a:schemeClr val="bg1"/>
+                  </a:solidFill>
+                  <a:ea typeface=""/>
+                  <a:cs typeface=""/>
+                </a:rPr>
+                <a:t>P</a:t>
+              </a:r>
+              <a:endParaRPr kumimoji="0" lang="en-US" sz="2400" b="1" i="0" u="none" strike="noStrike" kern="0" cap="none" spc="0" normalizeH="0" baseline="0" noProof="0" dirty="0" smtClean="0">
+                <a:ln>
+                  <a:noFill/>
+                </a:ln>
+                <a:solidFill>
+                  <a:schemeClr val="bg1"/>
+                </a:solidFill>
+                <a:effectLst/>
+                <a:uLnTx/>
+                <a:uFillTx/>
+                <a:ea typeface=""/>
+                <a:cs typeface=""/>
+              </a:endParaRPr>
+            </a:p>
+          </p:txBody>
+        </p:sp>
+        <p:sp>
+          <p:nvSpPr>
+            <p:cNvPr id="67" name="Document 66"/>
+            <p:cNvSpPr/>
+            <p:nvPr/>
+          </p:nvSpPr>
+          <p:spPr>
+            <a:xfrm>
+              <a:off x="4341185" y="3353180"/>
+              <a:ext cx="547666" cy="433746"/>
+            </a:xfrm>
+            <a:prstGeom prst="flowChartDocument">
+              <a:avLst/>
+            </a:prstGeom>
+            <a:solidFill>
+              <a:srgbClr val="FF0000"/>
+            </a:solidFill>
+            <a:ln w="19050">
+              <a:solidFill>
+                <a:srgbClr val="0070C0"/>
+              </a:solidFill>
+            </a:ln>
+          </p:spPr>
+          <p:style>
+            <a:lnRef idx="2">
+              <a:schemeClr val="accent1">
+                <a:shade val="50000"/>
+              </a:schemeClr>
+            </a:lnRef>
+            <a:fillRef idx="1">
+              <a:schemeClr val="accent1"/>
+            </a:fillRef>
+            <a:effectRef idx="0">
+              <a:schemeClr val="accent1"/>
+            </a:effectRef>
+            <a:fontRef idx="minor">
+              <a:schemeClr val="lt1"/>
+            </a:fontRef>
+          </p:style>
+          <p:txBody>
+            <a:bodyPr rtlCol="0" anchor="ctr"/>
+            <a:lstStyle/>
+            <a:p>
+              <a:pPr algn="ctr"/>
+              <a:r>
+                <a:rPr lang="en-US" sz="2400" b="1" dirty="0" smtClean="0">
+                  <a:solidFill>
+                    <a:schemeClr val="bg1"/>
+                  </a:solidFill>
+                </a:rPr>
+                <a:t>L</a:t>
+              </a:r>
+              <a:endParaRPr lang="en-US" sz="2400" b="1" dirty="0">
+                <a:solidFill>
+                  <a:schemeClr val="bg1"/>
+                </a:solidFill>
+              </a:endParaRPr>
+            </a:p>
+          </p:txBody>
+        </p:sp>
+        <p:sp>
+          <p:nvSpPr>
+            <p:cNvPr id="68" name="Rounded Rectangle 67"/>
+            <p:cNvSpPr/>
+            <p:nvPr/>
+          </p:nvSpPr>
+          <p:spPr>
+            <a:xfrm>
+              <a:off x="5036501" y="3078579"/>
+              <a:ext cx="595004" cy="549201"/>
+            </a:xfrm>
+            <a:prstGeom prst="roundRect">
+              <a:avLst/>
+            </a:prstGeom>
+            <a:solidFill>
+              <a:srgbClr val="FFC000"/>
+            </a:solidFill>
+            <a:ln w="28575" cmpd="sng">
+              <a:solidFill>
+                <a:srgbClr val="0070C0"/>
+              </a:solidFill>
+            </a:ln>
+            <a:effectLst/>
+          </p:spPr>
+          <p:style>
+            <a:lnRef idx="1">
+              <a:schemeClr val="accent1"/>
+            </a:lnRef>
+            <a:fillRef idx="3">
+              <a:schemeClr val="accent1"/>
+            </a:fillRef>
+            <a:effectRef idx="2">
+              <a:schemeClr val="accent1"/>
+            </a:effectRef>
+            <a:fontRef idx="minor">
+              <a:schemeClr val="lt1"/>
+            </a:fontRef>
+          </p:style>
+          <p:txBody>
+            <a:bodyPr rtlCol="0" anchor="ctr"/>
+            <a:lstStyle/>
+            <a:p>
+              <a:pPr algn="ctr"/>
+              <a:r>
+                <a:rPr lang="en-US" sz="2400" b="1" dirty="0" smtClean="0">
+                  <a:solidFill>
+                    <a:srgbClr val="4372C4"/>
+                  </a:solidFill>
+                  <a:ea typeface="Arial" charset="0"/>
+                  <a:cs typeface="Arial" charset="0"/>
+                </a:rPr>
+                <a:t>S</a:t>
+              </a:r>
+              <a:endParaRPr lang="en-US" sz="2400" b="1" dirty="0">
+                <a:solidFill>
+                  <a:srgbClr val="4372C4"/>
+                </a:solidFill>
+                <a:ea typeface="Arial" charset="0"/>
+                <a:cs typeface="Arial" charset="0"/>
+              </a:endParaRPr>
+            </a:p>
+          </p:txBody>
+        </p:sp>
+      </p:grpSp>
+      <p:cxnSp>
+        <p:nvCxnSpPr>
+          <p:cNvPr id="70" name="Straight Connector 69"/>
+          <p:cNvCxnSpPr>
+            <a:stCxn id="71" idx="0"/>
+            <a:endCxn id="50" idx="0"/>
+          </p:cNvCxnSpPr>
+          <p:nvPr/>
+        </p:nvCxnSpPr>
+        <p:spPr>
+          <a:xfrm>
+            <a:off x="3180777" y="4009419"/>
+            <a:ext cx="1" cy="990044"/>
+          </a:xfrm>
+          <a:prstGeom prst="line">
+            <a:avLst/>
+          </a:prstGeom>
+          <a:solidFill>
+            <a:schemeClr val="accent1"/>
+          </a:solidFill>
+          <a:ln w="38100" cap="flat" cmpd="sng" algn="ctr">
+            <a:solidFill>
+              <a:schemeClr val="accent1"/>
+            </a:solidFill>
+            <a:prstDash val="solid"/>
+            <a:tailEnd type="none"/>
+          </a:ln>
+          <a:effectLst>
+            <a:outerShdw blurRad="40000" dist="20000" dir="5400000" rotWithShape="0">
+              <a:srgbClr val="000000">
+                <a:alpha val="38000"/>
+              </a:srgbClr>
+            </a:outerShdw>
+          </a:effectLst>
+        </p:spPr>
+      </p:cxnSp>
+      <p:sp>
+        <p:nvSpPr>
+          <p:cNvPr id="71" name="Oval 70"/>
+          <p:cNvSpPr/>
+          <p:nvPr/>
+        </p:nvSpPr>
+        <p:spPr>
+          <a:xfrm flipV="1">
+            <a:off x="3099776" y="3847418"/>
+            <a:ext cx="162001" cy="162001"/>
+          </a:xfrm>
+          <a:prstGeom prst="ellipse">
+            <a:avLst/>
+          </a:prstGeom>
+          <a:solidFill>
+            <a:schemeClr val="accent1"/>
+          </a:solidFill>
+          <a:ln w="25400" cmpd="sng">
+            <a:solidFill>
+              <a:schemeClr val="tx2"/>
+            </a:solidFill>
+          </a:ln>
+          <a:effectLst>
+            <a:outerShdw blurRad="50800" dist="38100" dir="2700000" algn="tl" rotWithShape="0">
+              <a:prstClr val="black">
+                <a:alpha val="40000"/>
+              </a:prstClr>
+            </a:outerShdw>
+          </a:effectLst>
+        </p:spPr>
+        <p:style>
+          <a:lnRef idx="1">
+            <a:schemeClr val="accent1"/>
+          </a:lnRef>
+          <a:fillRef idx="3">
+            <a:schemeClr val="accent1"/>
+          </a:fillRef>
+          <a:effectRef idx="2">
+            <a:schemeClr val="accent1"/>
+          </a:effectRef>
+          <a:fontRef idx="minor">
+            <a:schemeClr val="lt1"/>
+          </a:fontRef>
+        </p:style>
+        <p:txBody>
+          <a:bodyPr rtlCol="0" anchor="ctr"/>
+          <a:lstStyle/>
+          <a:p>
+            <a:pPr algn="ctr"/>
+            <a:endParaRPr lang="en-GB" sz="1000">
+              <a:solidFill>
+                <a:srgbClr val="000000"/>
+              </a:solidFill>
+            </a:endParaRPr>
+          </a:p>
+        </p:txBody>
+      </p:sp>
+    </p:spTree>
+    <p:extLst>
+      <p:ext uri="{BB962C8B-B14F-4D97-AF65-F5344CB8AC3E}">
+        <p14:creationId xmlns:p14="http://schemas.microsoft.com/office/powerpoint/2010/main" val="2019400975"/>
+      </p:ext>
+    </p:extLst>
+  </p:cSld>
+  <p:clrMapOvr>
+    <a:masterClrMapping/>
+  </p:clrMapOvr>
+  <p:timing>
+    <p:tnLst>
+      <p:par>
+        <p:cTn id="1" dur="indefinite" restart="never" nodeType="tmRoot">
+          <p:childTnLst>
+            <p:seq concurrent="1" nextAc="seek">
+              <p:cTn id="2" dur="indefinite" nodeType="mainSeq">
+                <p:childTnLst>
+                  <p:par>
+                    <p:cTn id="3" fill="hold">
+                      <p:stCondLst>
+                        <p:cond delay="indefinite"/>
+                        <p:cond evt="onBegin" delay="0">
+                          <p:tn val="2"/>
+                        </p:cond>
+                      </p:stCondLst>
+                      <p:childTnLst>
+                        <p:par>
+                          <p:cTn id="4" fill="hold">
+                            <p:stCondLst>
+                              <p:cond delay="0"/>
+                            </p:stCondLst>
+                            <p:childTnLst>
+                              <p:par>
+                                <p:cTn id="5" presetID="1" presetClass="entr" presetSubtype="0" fill="hold" grpId="0" nodeType="withEffect">
+                                  <p:stCondLst>
+                                    <p:cond delay="0"/>
+                                  </p:stCondLst>
+                                  <p:childTnLst>
+                                    <p:set>
+                                      <p:cBhvr>
+                                        <p:cTn id="6" dur="1" fill="hold">
+                                          <p:stCondLst>
+                                            <p:cond delay="0"/>
+                                          </p:stCondLst>
+                                        </p:cTn>
+                                        <p:tgtEl>
+                                          <p:spTgt spid="41"/>
+                                        </p:tgtEl>
+                                        <p:attrNameLst>
+                                          <p:attrName>style.visibility</p:attrName>
+                                        </p:attrNameLst>
+                                      </p:cBhvr>
+                                      <p:to>
+                                        <p:strVal val="visible"/>
+                                      </p:to>
+                                    </p:set>
+                                  </p:childTnLst>
+                                </p:cTn>
+                              </p:par>
+                            </p:childTnLst>
+                          </p:cTn>
+                        </p:par>
+                      </p:childTnLst>
+                    </p:cTn>
+                  </p:par>
+                </p:childTnLst>
+              </p:cTn>
+              <p:prevCondLst>
+                <p:cond evt="onPrev" delay="0">
+                  <p:tgtEl>
+                    <p:sldTgt/>
+                  </p:tgtEl>
+                </p:cond>
+              </p:prevCondLst>
+              <p:nextCondLst>
+                <p:cond evt="onNext" delay="0">
+                  <p:tgtEl>
+                    <p:sldTgt/>
+                  </p:tgtEl>
+                </p:cond>
+              </p:nextCondLst>
+            </p:seq>
+          </p:childTnLst>
+        </p:cTn>
+      </p:par>
+    </p:tnLst>
+    <p:bldLst>
+      <p:bldP spid="41" grpId="0" animBg="1"/>
+    </p:bldLst>
+  </p:timing>
+</p:sld>
+</file>
+
+<file path=ppt/slides/slide25.xml><?xml version="1.0" encoding="utf-8"?>
+<p:sld xmlns:a="http://schemas.openxmlformats.org/drawingml/2006/main" xmlns:r="http://schemas.openxmlformats.org/officeDocument/2006/relationships" xmlns:p="http://schemas.openxmlformats.org/presentationml/2006/main">
+  <p:cSld>
+    <p:spTree>
+      <p:nvGrpSpPr>
+        <p:cNvPr id="1" name=""/>
+        <p:cNvGrpSpPr/>
+        <p:nvPr/>
+      </p:nvGrpSpPr>
+      <p:grpSpPr>
+        <a:xfrm>
+          <a:off x="0" y="0"/>
+          <a:ext cx="0" cy="0"/>
+          <a:chOff x="0" y="0"/>
+          <a:chExt cx="0" cy="0"/>
+        </a:xfrm>
+      </p:grpSpPr>
+      <p:sp>
+        <p:nvSpPr>
+          <p:cNvPr id="2" name="Title 1"/>
+          <p:cNvSpPr>
+            <a:spLocks noGrp="1"/>
+          </p:cNvSpPr>
+          <p:nvPr>
+            <p:ph type="title"/>
+          </p:nvPr>
+        </p:nvSpPr>
+        <p:spPr>
+          <a:xfrm>
+            <a:off x="838200" y="400641"/>
+            <a:ext cx="10515600" cy="1325563"/>
+          </a:xfrm>
+        </p:spPr>
+        <p:txBody>
+          <a:bodyPr/>
+          <a:lstStyle/>
+          <a:p>
+            <a:r>
+              <a:rPr lang="en-US" dirty="0" smtClean="0"/>
+              <a:t>Diagram </a:t>
+            </a:r>
+            <a:r>
+              <a:rPr lang="en-US" dirty="0"/>
+              <a:t>2</a:t>
+            </a:r>
+            <a:endParaRPr lang="en-US" dirty="0"/>
+          </a:p>
+        </p:txBody>
+      </p:sp>
+      <p:sp>
+        <p:nvSpPr>
+          <p:cNvPr id="4" name="Slide Number Placeholder 3"/>
+          <p:cNvSpPr>
+            <a:spLocks noGrp="1"/>
+          </p:cNvSpPr>
+          <p:nvPr>
+            <p:ph type="sldNum" sz="quarter" idx="12"/>
+          </p:nvPr>
+        </p:nvSpPr>
+        <p:spPr>
+          <a:xfrm>
+            <a:off x="276261" y="6356348"/>
+            <a:ext cx="2743200" cy="365125"/>
+          </a:xfrm>
+        </p:spPr>
+        <p:txBody>
+          <a:bodyPr/>
+          <a:lstStyle/>
+          <a:p>
+            <a:fld id="{2AF5F8E0-9CB9-8D41-B80C-6B76C9B710FC}" type="slidenum">
+              <a:rPr lang="en-US" smtClean="0"/>
+              <a:pPr/>
+              <a:t>25</a:t>
+            </a:fld>
+            <a:endParaRPr lang="en-US"/>
+          </a:p>
+        </p:txBody>
+      </p:sp>
+      <p:grpSp>
+        <p:nvGrpSpPr>
+          <p:cNvPr id="49" name="Group 48"/>
+          <p:cNvGrpSpPr/>
+          <p:nvPr/>
+        </p:nvGrpSpPr>
+        <p:grpSpPr>
+          <a:xfrm>
+            <a:off x="2751592" y="2154027"/>
+            <a:ext cx="7259830" cy="3214924"/>
+            <a:chOff x="2751592" y="2154027"/>
+            <a:chExt cx="7259830" cy="3214924"/>
+          </a:xfrm>
+        </p:grpSpPr>
+        <p:sp>
+          <p:nvSpPr>
+            <p:cNvPr id="66" name="Rounded Rectangle 65"/>
+            <p:cNvSpPr/>
+            <p:nvPr/>
+          </p:nvSpPr>
+          <p:spPr>
+            <a:xfrm>
+              <a:off x="6443144" y="2986027"/>
+              <a:ext cx="1182501" cy="1171891"/>
+            </a:xfrm>
+            <a:prstGeom prst="roundRect">
+              <a:avLst/>
+            </a:prstGeom>
+            <a:solidFill>
+              <a:srgbClr val="4372C4"/>
+            </a:solidFill>
+            <a:ln w="28575" cap="flat" cmpd="sng" algn="ctr">
+              <a:solidFill>
+                <a:schemeClr val="tx2"/>
+              </a:solidFill>
+              <a:prstDash val="solid"/>
+            </a:ln>
+            <a:effectLst>
+              <a:outerShdw blurRad="40000" dist="23000" dir="5400000" rotWithShape="0">
+                <a:srgbClr val="000000">
+                  <a:alpha val="35000"/>
+                </a:srgbClr>
+              </a:outerShdw>
+            </a:effectLst>
+          </p:spPr>
+          <p:txBody>
+            <a:bodyPr tIns="36000" bIns="36000" rtlCol="0" anchor="ctr"/>
+            <a:lstStyle/>
+            <a:p>
+              <a:pPr marL="0" marR="0" lvl="0" indent="0" algn="ctr" defTabSz="457200" eaLnBrk="1" fontAlgn="auto" latinLnBrk="0" hangingPunct="1">
+                <a:lnSpc>
+                  <a:spcPct val="100000"/>
+                </a:lnSpc>
+                <a:spcBef>
+                  <a:spcPts val="0"/>
+                </a:spcBef>
+                <a:spcAft>
+                  <a:spcPts val="0"/>
+                </a:spcAft>
+                <a:buClrTx/>
+                <a:buSzTx/>
+                <a:buFontTx/>
+                <a:buNone/>
+                <a:tabLst/>
+                <a:defRPr/>
+              </a:pPr>
+              <a:r>
+                <a:rPr lang="en-US" sz="2400" b="1" kern="0" noProof="0" dirty="0" smtClean="0">
+                  <a:solidFill>
+                    <a:schemeClr val="bg1"/>
+                  </a:solidFill>
+                  <a:ea typeface=""/>
+                  <a:cs typeface=""/>
+                </a:rPr>
+                <a:t>P</a:t>
+              </a:r>
+              <a:endParaRPr kumimoji="0" lang="en-US" sz="2400" b="1" i="0" u="none" strike="noStrike" kern="0" cap="none" spc="0" normalizeH="0" baseline="0" noProof="0" dirty="0" smtClean="0">
+                <a:ln>
+                  <a:noFill/>
+                </a:ln>
+                <a:solidFill>
+                  <a:schemeClr val="bg1"/>
+                </a:solidFill>
+                <a:effectLst/>
+                <a:uLnTx/>
+                <a:uFillTx/>
+                <a:ea typeface=""/>
+                <a:cs typeface=""/>
+              </a:endParaRPr>
+            </a:p>
+          </p:txBody>
+        </p:sp>
+        <p:sp>
+          <p:nvSpPr>
+            <p:cNvPr id="67" name="Document 66"/>
+            <p:cNvSpPr/>
+            <p:nvPr/>
+          </p:nvSpPr>
+          <p:spPr>
+            <a:xfrm>
+              <a:off x="7425473" y="3912317"/>
+              <a:ext cx="1157302" cy="916572"/>
+            </a:xfrm>
+            <a:prstGeom prst="flowChartDocument">
+              <a:avLst/>
+            </a:prstGeom>
+            <a:solidFill>
+              <a:srgbClr val="FF0000"/>
+            </a:solidFill>
+            <a:ln w="19050">
+              <a:solidFill>
+                <a:srgbClr val="0070C0"/>
+              </a:solidFill>
+            </a:ln>
+          </p:spPr>
+          <p:style>
+            <a:lnRef idx="2">
+              <a:schemeClr val="accent1">
+                <a:shade val="50000"/>
+              </a:schemeClr>
+            </a:lnRef>
+            <a:fillRef idx="1">
+              <a:schemeClr val="accent1"/>
+            </a:fillRef>
+            <a:effectRef idx="0">
+              <a:schemeClr val="accent1"/>
+            </a:effectRef>
+            <a:fontRef idx="minor">
+              <a:schemeClr val="lt1"/>
+            </a:fontRef>
+          </p:style>
+          <p:txBody>
+            <a:bodyPr rtlCol="0" anchor="ctr"/>
+            <a:lstStyle/>
+            <a:p>
+              <a:pPr algn="ctr"/>
+              <a:r>
+                <a:rPr lang="en-US" sz="2400" b="1" dirty="0" smtClean="0">
+                  <a:solidFill>
+                    <a:schemeClr val="bg1"/>
+                  </a:solidFill>
+                </a:rPr>
+                <a:t>L</a:t>
+              </a:r>
+              <a:endParaRPr lang="en-US" sz="2400" b="1" dirty="0">
+                <a:solidFill>
+                  <a:schemeClr val="bg1"/>
+                </a:solidFill>
+              </a:endParaRPr>
+            </a:p>
+          </p:txBody>
+        </p:sp>
+        <p:sp>
+          <p:nvSpPr>
+            <p:cNvPr id="68" name="Rounded Rectangle 67"/>
+            <p:cNvSpPr/>
+            <p:nvPr/>
+          </p:nvSpPr>
+          <p:spPr>
+            <a:xfrm>
+              <a:off x="7375457" y="2154027"/>
+              <a:ext cx="1257334" cy="1160546"/>
+            </a:xfrm>
+            <a:prstGeom prst="roundRect">
+              <a:avLst/>
+            </a:prstGeom>
+            <a:solidFill>
+              <a:srgbClr val="FFC000"/>
+            </a:solidFill>
+            <a:ln w="28575" cmpd="sng">
+              <a:solidFill>
+                <a:srgbClr val="0070C0"/>
+              </a:solidFill>
+            </a:ln>
+            <a:effectLst/>
+          </p:spPr>
+          <p:style>
+            <a:lnRef idx="1">
+              <a:schemeClr val="accent1"/>
+            </a:lnRef>
+            <a:fillRef idx="3">
+              <a:schemeClr val="accent1"/>
+            </a:fillRef>
+            <a:effectRef idx="2">
+              <a:schemeClr val="accent1"/>
+            </a:effectRef>
+            <a:fontRef idx="minor">
+              <a:schemeClr val="lt1"/>
+            </a:fontRef>
+          </p:style>
+          <p:txBody>
+            <a:bodyPr rtlCol="0" anchor="ctr"/>
+            <a:lstStyle/>
+            <a:p>
+              <a:pPr algn="ctr"/>
+              <a:r>
+                <a:rPr lang="en-US" sz="2400" b="1" dirty="0" smtClean="0">
+                  <a:solidFill>
+                    <a:srgbClr val="4372C4"/>
+                  </a:solidFill>
+                  <a:ea typeface="Arial" charset="0"/>
+                  <a:cs typeface="Arial" charset="0"/>
+                </a:rPr>
+                <a:t>S</a:t>
+              </a:r>
+              <a:endParaRPr lang="en-US" sz="2400" b="1" dirty="0">
+                <a:solidFill>
+                  <a:srgbClr val="4372C4"/>
+                </a:solidFill>
+                <a:ea typeface="Arial" charset="0"/>
+                <a:cs typeface="Arial" charset="0"/>
+              </a:endParaRPr>
+            </a:p>
+          </p:txBody>
+        </p:sp>
+        <p:cxnSp>
+          <p:nvCxnSpPr>
+            <p:cNvPr id="14" name="Straight Arrow Connector 13"/>
+            <p:cNvCxnSpPr>
+              <a:stCxn id="68" idx="2"/>
+              <a:endCxn id="67" idx="0"/>
+            </p:cNvCxnSpPr>
+            <p:nvPr/>
+          </p:nvCxnSpPr>
+          <p:spPr>
+            <a:xfrm>
+              <a:off x="8004124" y="3314573"/>
+              <a:ext cx="0" cy="597744"/>
+            </a:xfrm>
+            <a:prstGeom prst="straightConnector1">
+              <a:avLst/>
+            </a:prstGeom>
+            <a:ln w="28575">
+              <a:solidFill>
+                <a:srgbClr val="4372C4"/>
+              </a:solidFill>
+              <a:tailEnd type="triangle"/>
+            </a:ln>
+          </p:spPr>
+          <p:style>
+            <a:lnRef idx="1">
+              <a:schemeClr val="accent1"/>
+            </a:lnRef>
+            <a:fillRef idx="0">
+              <a:schemeClr val="accent1"/>
+            </a:fillRef>
+            <a:effectRef idx="0">
+              <a:schemeClr val="accent1"/>
+            </a:effectRef>
+            <a:fontRef idx="minor">
+              <a:schemeClr val="tx1"/>
+            </a:fontRef>
+          </p:style>
+        </p:cxnSp>
+        <p:sp>
+          <p:nvSpPr>
+            <p:cNvPr id="20" name="TextBox 19"/>
+            <p:cNvSpPr txBox="1"/>
+            <p:nvPr/>
+          </p:nvSpPr>
+          <p:spPr>
+            <a:xfrm>
+              <a:off x="8514012" y="3244113"/>
+              <a:ext cx="1497410" cy="738664"/>
+            </a:xfrm>
+            <a:prstGeom prst="rect">
+              <a:avLst/>
+            </a:prstGeom>
+            <a:noFill/>
+          </p:spPr>
+          <p:txBody>
+            <a:bodyPr wrap="square" rtlCol="0">
+              <a:spAutoFit/>
+            </a:bodyPr>
+            <a:lstStyle/>
+            <a:p>
+              <a:pPr algn="ctr"/>
+              <a:r>
+                <a:rPr lang="en-US" sz="1400" b="1" smtClean="0">
+                  <a:solidFill>
+                    <a:srgbClr val="4372C4"/>
+                  </a:solidFill>
+                </a:rPr>
+                <a:t>3. </a:t>
+              </a:r>
+              <a:r>
+                <a:rPr lang="en-US" sz="1400" b="1" dirty="0" smtClean="0">
+                  <a:solidFill>
+                    <a:srgbClr val="4372C4"/>
+                  </a:solidFill>
+                </a:rPr>
+                <a:t>smart contract queries or </a:t>
+              </a:r>
+            </a:p>
+            <a:p>
+              <a:pPr algn="ctr"/>
+              <a:r>
+                <a:rPr lang="en-US" sz="1400" b="1" dirty="0" smtClean="0">
+                  <a:solidFill>
+                    <a:srgbClr val="4372C4"/>
+                  </a:solidFill>
+                </a:rPr>
+                <a:t>updates ledger</a:t>
+              </a:r>
+              <a:endParaRPr lang="en-US" sz="1400" b="1" dirty="0">
+                <a:solidFill>
+                  <a:srgbClr val="4372C4"/>
+                </a:solidFill>
+              </a:endParaRPr>
+            </a:p>
+          </p:txBody>
+        </p:sp>
+        <p:sp>
+          <p:nvSpPr>
+            <p:cNvPr id="56" name="Rounded Rectangle 55"/>
+            <p:cNvSpPr/>
+            <p:nvPr/>
+          </p:nvSpPr>
+          <p:spPr>
+            <a:xfrm>
+              <a:off x="2751592" y="2986027"/>
+              <a:ext cx="1257334" cy="1160546"/>
+            </a:xfrm>
+            <a:prstGeom prst="roundRect">
+              <a:avLst/>
+            </a:prstGeom>
+            <a:solidFill>
+              <a:schemeClr val="bg1"/>
+            </a:solidFill>
+            <a:ln w="28575" cmpd="sng">
+              <a:solidFill>
+                <a:srgbClr val="0070C0"/>
+              </a:solidFill>
+            </a:ln>
+            <a:effectLst/>
+          </p:spPr>
+          <p:style>
+            <a:lnRef idx="1">
+              <a:schemeClr val="accent1"/>
+            </a:lnRef>
+            <a:fillRef idx="3">
+              <a:schemeClr val="accent1"/>
+            </a:fillRef>
+            <a:effectRef idx="2">
+              <a:schemeClr val="accent1"/>
+            </a:effectRef>
+            <a:fontRef idx="minor">
+              <a:schemeClr val="lt1"/>
+            </a:fontRef>
+          </p:style>
+          <p:txBody>
+            <a:bodyPr rtlCol="0" anchor="ctr"/>
+            <a:lstStyle/>
+            <a:p>
+              <a:pPr algn="ctr"/>
+              <a:r>
+                <a:rPr lang="en-US" sz="2400" b="1" smtClean="0">
+                  <a:solidFill>
+                    <a:srgbClr val="4372C4"/>
+                  </a:solidFill>
+                  <a:ea typeface="Arial" charset="0"/>
+                  <a:cs typeface="Arial" charset="0"/>
+                </a:rPr>
+                <a:t>A</a:t>
+              </a:r>
+              <a:endParaRPr lang="en-US" sz="2400" b="1" dirty="0">
+                <a:solidFill>
+                  <a:srgbClr val="4372C4"/>
+                </a:solidFill>
+                <a:ea typeface="Arial" charset="0"/>
+                <a:cs typeface="Arial" charset="0"/>
+              </a:endParaRPr>
+            </a:p>
+          </p:txBody>
+        </p:sp>
+        <p:cxnSp>
+          <p:nvCxnSpPr>
+            <p:cNvPr id="26" name="Straight Arrow Connector 25"/>
+            <p:cNvCxnSpPr>
+              <a:stCxn id="56" idx="3"/>
+              <a:endCxn id="66" idx="1"/>
+            </p:cNvCxnSpPr>
+            <p:nvPr/>
+          </p:nvCxnSpPr>
+          <p:spPr>
+            <a:xfrm>
+              <a:off x="4008926" y="3566300"/>
+              <a:ext cx="2434218" cy="5673"/>
+            </a:xfrm>
+            <a:prstGeom prst="straightConnector1">
+              <a:avLst/>
+            </a:prstGeom>
+            <a:ln w="28575">
+              <a:solidFill>
+                <a:srgbClr val="4372C4"/>
+              </a:solidFill>
+              <a:tailEnd type="triangle"/>
+            </a:ln>
+          </p:spPr>
+          <p:style>
+            <a:lnRef idx="1">
+              <a:schemeClr val="accent1"/>
+            </a:lnRef>
+            <a:fillRef idx="0">
+              <a:schemeClr val="accent1"/>
+            </a:fillRef>
+            <a:effectRef idx="0">
+              <a:schemeClr val="accent1"/>
+            </a:effectRef>
+            <a:fontRef idx="minor">
+              <a:schemeClr val="tx1"/>
+            </a:fontRef>
+          </p:style>
+        </p:cxnSp>
+        <p:cxnSp>
+          <p:nvCxnSpPr>
+            <p:cNvPr id="43" name="Elbow Connector 42"/>
+            <p:cNvCxnSpPr>
+              <a:stCxn id="66" idx="0"/>
+              <a:endCxn id="68" idx="1"/>
+            </p:cNvCxnSpPr>
+            <p:nvPr/>
+          </p:nvCxnSpPr>
+          <p:spPr>
+            <a:xfrm rot="5400000" flipH="1" flipV="1">
+              <a:off x="7079063" y="2689633"/>
+              <a:ext cx="251727" cy="341062"/>
+            </a:xfrm>
+            <a:prstGeom prst="bentConnector2">
+              <a:avLst/>
+            </a:prstGeom>
+            <a:ln w="28575">
+              <a:solidFill>
+                <a:srgbClr val="4372C4"/>
+              </a:solidFill>
+              <a:tailEnd type="triangle"/>
+            </a:ln>
+          </p:spPr>
+          <p:style>
+            <a:lnRef idx="1">
+              <a:schemeClr val="accent1"/>
+            </a:lnRef>
+            <a:fillRef idx="0">
+              <a:schemeClr val="accent1"/>
+            </a:fillRef>
+            <a:effectRef idx="0">
+              <a:schemeClr val="accent1"/>
+            </a:effectRef>
+            <a:fontRef idx="minor">
+              <a:schemeClr val="tx1"/>
+            </a:fontRef>
+          </p:style>
+        </p:cxnSp>
+        <p:sp>
+          <p:nvSpPr>
+            <p:cNvPr id="69" name="TextBox 68"/>
+            <p:cNvSpPr txBox="1"/>
+            <p:nvPr/>
+          </p:nvSpPr>
+          <p:spPr>
+            <a:xfrm>
+              <a:off x="4543506" y="3566299"/>
+              <a:ext cx="1507985" cy="523220"/>
+            </a:xfrm>
+            <a:prstGeom prst="rect">
+              <a:avLst/>
+            </a:prstGeom>
+            <a:noFill/>
+          </p:spPr>
+          <p:txBody>
+            <a:bodyPr wrap="square" rtlCol="0">
+              <a:spAutoFit/>
+            </a:bodyPr>
+            <a:lstStyle/>
+            <a:p>
+              <a:pPr algn="ctr"/>
+              <a:r>
+                <a:rPr lang="en-US" sz="1400" b="1" dirty="0" smtClean="0">
+                  <a:solidFill>
+                    <a:srgbClr val="4372C4"/>
+                  </a:solidFill>
+                </a:rPr>
+                <a:t>1. application connects to peer</a:t>
+              </a:r>
+              <a:endParaRPr lang="en-US" sz="1400" b="1" dirty="0">
+                <a:solidFill>
+                  <a:srgbClr val="4372C4"/>
+                </a:solidFill>
+              </a:endParaRPr>
+            </a:p>
+          </p:txBody>
+        </p:sp>
+        <p:sp>
+          <p:nvSpPr>
+            <p:cNvPr id="72" name="TextBox 71"/>
+            <p:cNvSpPr txBox="1"/>
+            <p:nvPr/>
+          </p:nvSpPr>
+          <p:spPr>
+            <a:xfrm>
+              <a:off x="5554778" y="2289263"/>
+              <a:ext cx="1526646" cy="523220"/>
+            </a:xfrm>
+            <a:prstGeom prst="rect">
+              <a:avLst/>
+            </a:prstGeom>
+            <a:noFill/>
+          </p:spPr>
+          <p:txBody>
+            <a:bodyPr wrap="square" rtlCol="0">
+              <a:spAutoFit/>
+            </a:bodyPr>
+            <a:lstStyle/>
+            <a:p>
+              <a:pPr algn="ctr"/>
+              <a:r>
+                <a:rPr lang="en-US" sz="1400" b="1" smtClean="0">
+                  <a:solidFill>
+                    <a:srgbClr val="4372C4"/>
+                  </a:solidFill>
+                </a:rPr>
+                <a:t>2. </a:t>
+              </a:r>
+              <a:r>
+                <a:rPr lang="en-US" sz="1400" b="1" dirty="0" smtClean="0">
+                  <a:solidFill>
+                    <a:srgbClr val="4372C4"/>
+                  </a:solidFill>
+                </a:rPr>
+                <a:t>peer invokes smart contract</a:t>
+              </a:r>
+              <a:endParaRPr lang="en-US" sz="1400" b="1" dirty="0">
+                <a:solidFill>
+                  <a:srgbClr val="4372C4"/>
+                </a:solidFill>
+              </a:endParaRPr>
+            </a:p>
+          </p:txBody>
+        </p:sp>
+        <p:cxnSp>
+          <p:nvCxnSpPr>
+            <p:cNvPr id="47" name="Elbow Connector 46"/>
+            <p:cNvCxnSpPr>
+              <a:stCxn id="66" idx="2"/>
+              <a:endCxn id="56" idx="2"/>
+            </p:cNvCxnSpPr>
+            <p:nvPr/>
+          </p:nvCxnSpPr>
+          <p:spPr>
+            <a:xfrm rot="5400000" flipH="1">
+              <a:off x="5201654" y="2325178"/>
+              <a:ext cx="11345" cy="3654136"/>
+            </a:xfrm>
+            <a:prstGeom prst="bentConnector3">
+              <a:avLst>
+                <a:gd name="adj1" fmla="val -5902741"/>
+              </a:avLst>
+            </a:prstGeom>
+            <a:ln w="28575">
+              <a:solidFill>
+                <a:srgbClr val="4372C4"/>
+              </a:solidFill>
+              <a:tailEnd type="triangle"/>
+            </a:ln>
+          </p:spPr>
+          <p:style>
+            <a:lnRef idx="1">
+              <a:schemeClr val="accent1"/>
+            </a:lnRef>
+            <a:fillRef idx="0">
+              <a:schemeClr val="accent1"/>
+            </a:fillRef>
+            <a:effectRef idx="0">
+              <a:schemeClr val="accent1"/>
+            </a:effectRef>
+            <a:fontRef idx="minor">
+              <a:schemeClr val="tx1"/>
+            </a:fontRef>
+          </p:style>
+        </p:cxnSp>
+        <p:sp>
+          <p:nvSpPr>
+            <p:cNvPr id="73" name="TextBox 72"/>
+            <p:cNvSpPr txBox="1"/>
+            <p:nvPr/>
+          </p:nvSpPr>
+          <p:spPr>
+            <a:xfrm>
+              <a:off x="4054697" y="4845731"/>
+              <a:ext cx="2485602" cy="523220"/>
+            </a:xfrm>
+            <a:prstGeom prst="rect">
+              <a:avLst/>
+            </a:prstGeom>
+            <a:noFill/>
+          </p:spPr>
+          <p:txBody>
+            <a:bodyPr wrap="square" rtlCol="0">
+              <a:spAutoFit/>
+            </a:bodyPr>
+            <a:lstStyle/>
+            <a:p>
+              <a:pPr algn="ctr"/>
+              <a:r>
+                <a:rPr lang="en-US" sz="1400" b="1" smtClean="0">
+                  <a:solidFill>
+                    <a:srgbClr val="4372C4"/>
+                  </a:solidFill>
+                </a:rPr>
+                <a:t>4. </a:t>
+              </a:r>
+              <a:r>
+                <a:rPr lang="en-US" sz="1400" b="1" dirty="0" smtClean="0">
+                  <a:solidFill>
+                    <a:srgbClr val="4372C4"/>
+                  </a:solidFill>
+                </a:rPr>
+                <a:t>peer notifies application when ledger update complete</a:t>
+              </a:r>
+              <a:endParaRPr lang="en-US" sz="1400" b="1" dirty="0">
+                <a:solidFill>
+                  <a:srgbClr val="4372C4"/>
+                </a:solidFill>
+              </a:endParaRPr>
+            </a:p>
+          </p:txBody>
+        </p:sp>
+        <p:pic>
+          <p:nvPicPr>
+            <p:cNvPr id="5122" name="Picture 2" descr="https://d30y9cdsu7xlg0.cloudfront.net/png/1152578-200.png"/>
+            <p:cNvPicPr>
+              <a:picLocks noChangeAspect="1" noChangeArrowheads="1"/>
+            </p:cNvPicPr>
+            <p:nvPr/>
+          </p:nvPicPr>
+          <p:blipFill>
+            <a:blip r:embed="rId2">
+              <a:duotone>
+                <a:schemeClr val="accent1">
+                  <a:shade val="45000"/>
+                  <a:satMod val="135000"/>
+                </a:schemeClr>
+                <a:prstClr val="white"/>
+              </a:duotone>
+              <a:extLst>
+                <a:ext uri="{28A0092B-C50C-407E-A947-70E740481C1C}">
+                  <a14:useLocalDpi xmlns:a14="http://schemas.microsoft.com/office/drawing/2010/main" val="0"/>
+                </a:ext>
+              </a:extLst>
+            </a:blip>
+            <a:srcRect/>
+            <a:stretch>
+              <a:fillRect/>
+            </a:stretch>
+          </p:blipFill>
+          <p:spPr bwMode="auto">
+            <a:xfrm>
+              <a:off x="6528147" y="4292454"/>
+              <a:ext cx="553276" cy="553276"/>
+            </a:xfrm>
+            <a:prstGeom prst="rect">
+              <a:avLst/>
+            </a:prstGeom>
+            <a:noFill/>
+            <a:extLst>
+              <a:ext uri="{909E8E84-426E-40DD-AFC4-6F175D3DCCD1}">
+                <a14:hiddenFill xmlns:a14="http://schemas.microsoft.com/office/drawing/2010/main">
+                  <a:solidFill>
+                    <a:srgbClr val="FFFFFF"/>
+                  </a:solidFill>
+                </a14:hiddenFill>
+              </a:ext>
+            </a:extLst>
+          </p:spPr>
+        </p:pic>
+      </p:grpSp>
+    </p:spTree>
+    <p:extLst>
+      <p:ext uri="{BB962C8B-B14F-4D97-AF65-F5344CB8AC3E}">
+        <p14:creationId xmlns:p14="http://schemas.microsoft.com/office/powerpoint/2010/main" val="1591314553"/>
+      </p:ext>
+    </p:extLst>
+  </p:cSld>
+  <p:clrMapOvr>
+    <a:masterClrMapping/>
+  </p:clrMapOvr>
+  <p:timing>
+    <p:tnLst>
+      <p:par>
+        <p:cTn id="1" dur="indefinite" restart="never" nodeType="tmRoot"/>
+      </p:par>
+    </p:tnLst>
+  </p:timing>
+</p:sld>
+</file>
+
+<file path=ppt/slides/slide26.xml><?xml version="1.0" encoding="utf-8"?>
+<p:sld xmlns:a="http://schemas.openxmlformats.org/drawingml/2006/main" xmlns:r="http://schemas.openxmlformats.org/officeDocument/2006/relationships" xmlns:p="http://schemas.openxmlformats.org/presentationml/2006/main">
+  <p:cSld>
+    <p:spTree>
+      <p:nvGrpSpPr>
+        <p:cNvPr id="1" name=""/>
+        <p:cNvGrpSpPr/>
+        <p:nvPr/>
+      </p:nvGrpSpPr>
+      <p:grpSpPr>
+        <a:xfrm>
+          <a:off x="0" y="0"/>
+          <a:ext cx="0" cy="0"/>
+          <a:chOff x="0" y="0"/>
+          <a:chExt cx="0" cy="0"/>
+        </a:xfrm>
+      </p:grpSpPr>
+      <p:sp>
+        <p:nvSpPr>
+          <p:cNvPr id="2" name="Title 1"/>
+          <p:cNvSpPr>
+            <a:spLocks noGrp="1"/>
+          </p:cNvSpPr>
+          <p:nvPr>
+            <p:ph type="title"/>
+          </p:nvPr>
+        </p:nvSpPr>
+        <p:spPr>
+          <a:xfrm>
+            <a:off x="838200" y="400641"/>
+            <a:ext cx="10515600" cy="1325563"/>
+          </a:xfrm>
+        </p:spPr>
+        <p:txBody>
+          <a:bodyPr/>
+          <a:lstStyle/>
+          <a:p>
+            <a:r>
+              <a:rPr lang="en-US" dirty="0" smtClean="0"/>
+              <a:t>Diagram </a:t>
+            </a:r>
+            <a:r>
+              <a:rPr lang="en-US" dirty="0" smtClean="0"/>
+              <a:t>3 </a:t>
+            </a:r>
+            <a:r>
+              <a:rPr lang="mr-IN" dirty="0" smtClean="0"/>
+              <a:t>–</a:t>
+            </a:r>
+            <a:r>
+              <a:rPr lang="en-US" dirty="0" smtClean="0"/>
+              <a:t> The peer network and consensus, </a:t>
+            </a:r>
+            <a:r>
+              <a:rPr lang="en-US" dirty="0" err="1" smtClean="0"/>
+              <a:t>Orderers</a:t>
+            </a:r>
+            <a:r>
+              <a:rPr lang="en-US" dirty="0" smtClean="0"/>
+              <a:t>?</a:t>
+            </a:r>
+            <a:endParaRPr lang="en-US" dirty="0"/>
+          </a:p>
+        </p:txBody>
+      </p:sp>
+      <p:sp>
+        <p:nvSpPr>
+          <p:cNvPr id="4" name="Slide Number Placeholder 3"/>
+          <p:cNvSpPr>
+            <a:spLocks noGrp="1"/>
+          </p:cNvSpPr>
+          <p:nvPr>
+            <p:ph type="sldNum" sz="quarter" idx="12"/>
+          </p:nvPr>
+        </p:nvSpPr>
+        <p:spPr>
+          <a:xfrm>
+            <a:off x="276261" y="6356348"/>
+            <a:ext cx="2743200" cy="365125"/>
+          </a:xfrm>
+        </p:spPr>
+        <p:txBody>
+          <a:bodyPr/>
+          <a:lstStyle/>
+          <a:p>
+            <a:fld id="{2AF5F8E0-9CB9-8D41-B80C-6B76C9B710FC}" type="slidenum">
+              <a:rPr lang="en-US" smtClean="0"/>
+              <a:pPr/>
+              <a:t>26</a:t>
+            </a:fld>
+            <a:endParaRPr lang="en-US"/>
+          </a:p>
+        </p:txBody>
+      </p:sp>
+      <p:sp>
+        <p:nvSpPr>
+          <p:cNvPr id="66" name="Rounded Rectangle 65"/>
+          <p:cNvSpPr/>
+          <p:nvPr/>
+        </p:nvSpPr>
+        <p:spPr>
+          <a:xfrm>
+            <a:off x="2664708" y="2740033"/>
+            <a:ext cx="1182501" cy="1171891"/>
+          </a:xfrm>
+          <a:prstGeom prst="roundRect">
+            <a:avLst/>
+          </a:prstGeom>
+          <a:solidFill>
+            <a:srgbClr val="4372C4"/>
+          </a:solidFill>
+          <a:ln w="28575" cap="flat" cmpd="sng" algn="ctr">
+            <a:solidFill>
+              <a:schemeClr val="tx2"/>
+            </a:solidFill>
+            <a:prstDash val="solid"/>
+          </a:ln>
+          <a:effectLst>
+            <a:outerShdw blurRad="40000" dist="23000" dir="5400000" rotWithShape="0">
+              <a:srgbClr val="000000">
+                <a:alpha val="35000"/>
+              </a:srgbClr>
+            </a:outerShdw>
+          </a:effectLst>
+        </p:spPr>
+        <p:txBody>
+          <a:bodyPr tIns="36000" bIns="36000" rtlCol="0" anchor="ctr"/>
+          <a:lstStyle/>
+          <a:p>
+            <a:pPr marL="0" marR="0" lvl="0" indent="0" algn="ctr" defTabSz="457200" eaLnBrk="1" fontAlgn="auto" latinLnBrk="0" hangingPunct="1">
+              <a:lnSpc>
+                <a:spcPct val="100000"/>
+              </a:lnSpc>
+              <a:spcBef>
+                <a:spcPts val="0"/>
+              </a:spcBef>
+              <a:spcAft>
+                <a:spcPts val="0"/>
+              </a:spcAft>
+              <a:buClrTx/>
+              <a:buSzTx/>
+              <a:buFontTx/>
+              <a:buNone/>
+              <a:tabLst/>
+              <a:defRPr/>
+            </a:pPr>
+            <a:r>
+              <a:rPr lang="en-US" sz="2400" b="1" kern="0" noProof="0" dirty="0" smtClean="0">
+                <a:solidFill>
+                  <a:schemeClr val="bg1"/>
+                </a:solidFill>
+                <a:ea typeface=""/>
+                <a:cs typeface=""/>
+              </a:rPr>
+              <a:t>P</a:t>
+            </a:r>
+            <a:endParaRPr kumimoji="0" lang="en-US" sz="2400" b="1" i="0" u="none" strike="noStrike" kern="0" cap="none" spc="0" normalizeH="0" baseline="0" noProof="0" dirty="0" smtClean="0">
+              <a:ln>
+                <a:noFill/>
+              </a:ln>
+              <a:solidFill>
+                <a:schemeClr val="bg1"/>
+              </a:solidFill>
+              <a:effectLst/>
+              <a:uLnTx/>
+              <a:uFillTx/>
+              <a:ea typeface=""/>
+              <a:cs typeface=""/>
+            </a:endParaRPr>
+          </a:p>
+        </p:txBody>
+      </p:sp>
+      <p:sp>
+        <p:nvSpPr>
+          <p:cNvPr id="67" name="Document 66"/>
+          <p:cNvSpPr/>
+          <p:nvPr/>
+        </p:nvSpPr>
+        <p:spPr>
+          <a:xfrm>
+            <a:off x="3647037" y="3666323"/>
+            <a:ext cx="1157302" cy="916572"/>
+          </a:xfrm>
+          <a:prstGeom prst="flowChartDocument">
+            <a:avLst/>
+          </a:prstGeom>
+          <a:solidFill>
+            <a:srgbClr val="FF0000"/>
+          </a:solidFill>
+          <a:ln w="19050">
+            <a:solidFill>
+              <a:srgbClr val="0070C0"/>
+            </a:solidFill>
+          </a:ln>
+        </p:spPr>
+        <p:style>
+          <a:lnRef idx="2">
+            <a:schemeClr val="accent1">
+              <a:shade val="50000"/>
+            </a:schemeClr>
+          </a:lnRef>
+          <a:fillRef idx="1">
+            <a:schemeClr val="accent1"/>
+          </a:fillRef>
+          <a:effectRef idx="0">
+            <a:schemeClr val="accent1"/>
+          </a:effectRef>
+          <a:fontRef idx="minor">
+            <a:schemeClr val="lt1"/>
+          </a:fontRef>
+        </p:style>
+        <p:txBody>
+          <a:bodyPr rtlCol="0" anchor="ctr"/>
+          <a:lstStyle/>
+          <a:p>
+            <a:pPr algn="ctr"/>
+            <a:r>
+              <a:rPr lang="en-US" sz="2400" b="1" dirty="0" smtClean="0">
+                <a:solidFill>
+                  <a:schemeClr val="bg1"/>
+                </a:solidFill>
+              </a:rPr>
+              <a:t>L</a:t>
+            </a:r>
+            <a:endParaRPr lang="en-US" sz="2400" b="1" dirty="0">
+              <a:solidFill>
+                <a:schemeClr val="bg1"/>
+              </a:solidFill>
+            </a:endParaRPr>
+          </a:p>
+        </p:txBody>
+      </p:sp>
+      <p:sp>
+        <p:nvSpPr>
+          <p:cNvPr id="20" name="TextBox 19"/>
+          <p:cNvSpPr txBox="1"/>
+          <p:nvPr/>
+        </p:nvSpPr>
+        <p:spPr>
+          <a:xfrm>
+            <a:off x="4055634" y="4599737"/>
+            <a:ext cx="1497410" cy="523220"/>
+          </a:xfrm>
+          <a:prstGeom prst="rect">
+            <a:avLst/>
+          </a:prstGeom>
+          <a:noFill/>
+        </p:spPr>
+        <p:txBody>
+          <a:bodyPr wrap="square" rtlCol="0">
+            <a:spAutoFit/>
+          </a:bodyPr>
+          <a:lstStyle/>
+          <a:p>
+            <a:pPr algn="ctr"/>
+            <a:r>
+              <a:rPr lang="en-US" sz="1400" b="1" dirty="0" smtClean="0">
+                <a:solidFill>
+                  <a:srgbClr val="4372C4"/>
+                </a:solidFill>
+              </a:rPr>
+              <a:t>proposed</a:t>
+            </a:r>
+          </a:p>
+          <a:p>
+            <a:pPr algn="ctr"/>
+            <a:r>
+              <a:rPr lang="en-US" sz="1400" b="1" dirty="0" smtClean="0">
+                <a:solidFill>
+                  <a:srgbClr val="4372C4"/>
+                </a:solidFill>
+              </a:rPr>
+              <a:t>ledger update</a:t>
+            </a:r>
+            <a:endParaRPr lang="en-US" sz="1400" b="1" dirty="0">
+              <a:solidFill>
+                <a:srgbClr val="4372C4"/>
+              </a:solidFill>
+            </a:endParaRPr>
+          </a:p>
+        </p:txBody>
+      </p:sp>
+      <p:sp>
+        <p:nvSpPr>
+          <p:cNvPr id="72" name="TextBox 71"/>
+          <p:cNvSpPr txBox="1"/>
+          <p:nvPr/>
+        </p:nvSpPr>
+        <p:spPr>
+          <a:xfrm>
+            <a:off x="1776342" y="2043269"/>
+            <a:ext cx="1526646" cy="523220"/>
+          </a:xfrm>
+          <a:prstGeom prst="rect">
+            <a:avLst/>
+          </a:prstGeom>
+          <a:noFill/>
+        </p:spPr>
+        <p:txBody>
+          <a:bodyPr wrap="square" rtlCol="0">
+            <a:spAutoFit/>
+          </a:bodyPr>
+          <a:lstStyle/>
+          <a:p>
+            <a:pPr algn="ctr"/>
+            <a:r>
+              <a:rPr lang="en-US" sz="1400" b="1" dirty="0" smtClean="0">
+                <a:solidFill>
+                  <a:srgbClr val="4372C4"/>
+                </a:solidFill>
+              </a:rPr>
+              <a:t>2. peer invokes smart contract</a:t>
+            </a:r>
+            <a:endParaRPr lang="en-US" sz="1400" b="1" dirty="0">
+              <a:solidFill>
+                <a:srgbClr val="4372C4"/>
+              </a:solidFill>
+            </a:endParaRPr>
+          </a:p>
+        </p:txBody>
+      </p:sp>
+      <p:sp>
+        <p:nvSpPr>
+          <p:cNvPr id="73" name="TextBox 72"/>
+          <p:cNvSpPr txBox="1"/>
+          <p:nvPr/>
+        </p:nvSpPr>
+        <p:spPr>
+          <a:xfrm>
+            <a:off x="276261" y="4599737"/>
+            <a:ext cx="2485602" cy="523220"/>
+          </a:xfrm>
+          <a:prstGeom prst="rect">
+            <a:avLst/>
+          </a:prstGeom>
+          <a:noFill/>
+        </p:spPr>
+        <p:txBody>
+          <a:bodyPr wrap="square" rtlCol="0">
+            <a:spAutoFit/>
+          </a:bodyPr>
+          <a:lstStyle/>
+          <a:p>
+            <a:pPr algn="ctr"/>
+            <a:r>
+              <a:rPr lang="en-US" sz="1400" b="1" smtClean="0">
+                <a:solidFill>
+                  <a:srgbClr val="4372C4"/>
+                </a:solidFill>
+              </a:rPr>
+              <a:t>4. </a:t>
+            </a:r>
+            <a:r>
+              <a:rPr lang="en-US" sz="1400" b="1" dirty="0" smtClean="0">
+                <a:solidFill>
+                  <a:srgbClr val="4372C4"/>
+                </a:solidFill>
+              </a:rPr>
+              <a:t>peer notifies application when ledger update complete</a:t>
+            </a:r>
+            <a:endParaRPr lang="en-US" sz="1400" b="1" dirty="0">
+              <a:solidFill>
+                <a:srgbClr val="4372C4"/>
+              </a:solidFill>
+            </a:endParaRPr>
+          </a:p>
+        </p:txBody>
+      </p:sp>
+      <p:pic>
+        <p:nvPicPr>
+          <p:cNvPr id="5122" name="Picture 2" descr="https://d30y9cdsu7xlg0.cloudfront.net/png/1152578-200.png"/>
+          <p:cNvPicPr>
+            <a:picLocks noChangeAspect="1" noChangeArrowheads="1"/>
+          </p:cNvPicPr>
+          <p:nvPr/>
+        </p:nvPicPr>
+        <p:blipFill>
+          <a:blip r:embed="rId2">
+            <a:duotone>
+              <a:schemeClr val="accent1">
+                <a:shade val="45000"/>
+                <a:satMod val="135000"/>
+              </a:schemeClr>
+              <a:prstClr val="white"/>
+            </a:duotone>
+            <a:extLst>
+              <a:ext uri="{28A0092B-C50C-407E-A947-70E740481C1C}">
+                <a14:useLocalDpi xmlns:a14="http://schemas.microsoft.com/office/drawing/2010/main" val="0"/>
+              </a:ext>
+            </a:extLst>
+          </a:blip>
+          <a:srcRect/>
+          <a:stretch>
+            <a:fillRect/>
+          </a:stretch>
+        </p:blipFill>
+        <p:spPr bwMode="auto">
+          <a:xfrm>
+            <a:off x="2749711" y="4046460"/>
+            <a:ext cx="553276" cy="553276"/>
+          </a:xfrm>
+          <a:prstGeom prst="rect">
+            <a:avLst/>
+          </a:prstGeom>
+          <a:noFill/>
+          <a:extLst>
+            <a:ext uri="{909E8E84-426E-40DD-AFC4-6F175D3DCCD1}">
+              <a14:hiddenFill xmlns:a14="http://schemas.microsoft.com/office/drawing/2010/main">
+                <a:solidFill>
+                  <a:srgbClr val="FFFFFF"/>
+                </a:solidFill>
+              </a14:hiddenFill>
+            </a:ext>
+          </a:extLst>
+        </p:spPr>
+      </p:pic>
+      <p:sp>
+        <p:nvSpPr>
+          <p:cNvPr id="19" name="Rounded Rectangle 18"/>
+          <p:cNvSpPr/>
+          <p:nvPr/>
+        </p:nvSpPr>
+        <p:spPr>
+          <a:xfrm>
+            <a:off x="6320659" y="2943212"/>
+            <a:ext cx="1162663" cy="1147089"/>
+          </a:xfrm>
+          <a:prstGeom prst="roundRect">
+            <a:avLst/>
+          </a:prstGeom>
+          <a:solidFill>
+            <a:srgbClr val="00B050"/>
+          </a:solidFill>
+          <a:ln w="28575">
+            <a:solidFill>
+              <a:srgbClr val="0070C0"/>
+            </a:solidFill>
+          </a:ln>
+        </p:spPr>
+        <p:style>
+          <a:lnRef idx="2">
+            <a:schemeClr val="accent1">
+              <a:shade val="50000"/>
+            </a:schemeClr>
+          </a:lnRef>
+          <a:fillRef idx="1">
+            <a:schemeClr val="accent1"/>
+          </a:fillRef>
+          <a:effectRef idx="0">
+            <a:schemeClr val="accent1"/>
+          </a:effectRef>
+          <a:fontRef idx="minor">
+            <a:schemeClr val="lt1"/>
+          </a:fontRef>
+        </p:style>
+        <p:txBody>
+          <a:bodyPr rtlCol="0" anchor="ctr"/>
+          <a:lstStyle/>
+          <a:p>
+            <a:pPr algn="ctr"/>
+            <a:r>
+              <a:rPr lang="en-US" sz="2400" b="1" dirty="0" smtClean="0">
+                <a:solidFill>
+                  <a:schemeClr val="tx1"/>
+                </a:solidFill>
+              </a:rPr>
+              <a:t>O</a:t>
+            </a:r>
+            <a:endParaRPr lang="en-US" sz="2400" b="1" dirty="0">
+              <a:solidFill>
+                <a:schemeClr val="tx1"/>
+              </a:solidFill>
+            </a:endParaRPr>
+          </a:p>
+        </p:txBody>
+      </p:sp>
+      <p:sp>
+        <p:nvSpPr>
+          <p:cNvPr id="22" name="Rounded Rectangle 21"/>
+          <p:cNvSpPr/>
+          <p:nvPr/>
+        </p:nvSpPr>
+        <p:spPr>
+          <a:xfrm>
+            <a:off x="8004795" y="1483117"/>
+            <a:ext cx="1182501" cy="1171891"/>
+          </a:xfrm>
+          <a:prstGeom prst="roundRect">
+            <a:avLst/>
+          </a:prstGeom>
+          <a:solidFill>
+            <a:srgbClr val="4372C4"/>
+          </a:solidFill>
+          <a:ln w="28575" cap="flat" cmpd="sng" algn="ctr">
+            <a:solidFill>
+              <a:schemeClr val="tx2"/>
+            </a:solidFill>
+            <a:prstDash val="solid"/>
+          </a:ln>
+          <a:effectLst>
+            <a:outerShdw blurRad="40000" dist="23000" dir="5400000" rotWithShape="0">
+              <a:srgbClr val="000000">
+                <a:alpha val="35000"/>
+              </a:srgbClr>
+            </a:outerShdw>
+          </a:effectLst>
+        </p:spPr>
+        <p:txBody>
+          <a:bodyPr tIns="36000" bIns="36000" rtlCol="0" anchor="ctr"/>
+          <a:lstStyle/>
+          <a:p>
+            <a:pPr marL="0" marR="0" lvl="0" indent="0" algn="ctr" defTabSz="457200" eaLnBrk="1" fontAlgn="auto" latinLnBrk="0" hangingPunct="1">
+              <a:lnSpc>
+                <a:spcPct val="100000"/>
+              </a:lnSpc>
+              <a:spcBef>
+                <a:spcPts val="0"/>
+              </a:spcBef>
+              <a:spcAft>
+                <a:spcPts val="0"/>
+              </a:spcAft>
+              <a:buClrTx/>
+              <a:buSzTx/>
+              <a:buFontTx/>
+              <a:buNone/>
+              <a:tabLst/>
+              <a:defRPr/>
+            </a:pPr>
+            <a:r>
+              <a:rPr lang="en-US" sz="2400" b="1" kern="0" noProof="0" dirty="0" smtClean="0">
+                <a:solidFill>
+                  <a:schemeClr val="bg1"/>
+                </a:solidFill>
+                <a:ea typeface=""/>
+                <a:cs typeface=""/>
+              </a:rPr>
+              <a:t>P</a:t>
+            </a:r>
+            <a:endParaRPr kumimoji="0" lang="en-US" sz="2400" b="1" i="0" u="none" strike="noStrike" kern="0" cap="none" spc="0" normalizeH="0" baseline="0" noProof="0" dirty="0" smtClean="0">
+              <a:ln>
+                <a:noFill/>
+              </a:ln>
+              <a:solidFill>
+                <a:schemeClr val="bg1"/>
+              </a:solidFill>
+              <a:effectLst/>
+              <a:uLnTx/>
+              <a:uFillTx/>
+              <a:ea typeface=""/>
+              <a:cs typeface=""/>
+            </a:endParaRPr>
+          </a:p>
+        </p:txBody>
+      </p:sp>
+      <p:sp>
+        <p:nvSpPr>
+          <p:cNvPr id="23" name="Document 22"/>
+          <p:cNvSpPr/>
+          <p:nvPr/>
+        </p:nvSpPr>
+        <p:spPr>
+          <a:xfrm>
+            <a:off x="8987124" y="2409407"/>
+            <a:ext cx="1157302" cy="916572"/>
+          </a:xfrm>
+          <a:prstGeom prst="flowChartDocument">
+            <a:avLst/>
+          </a:prstGeom>
+          <a:solidFill>
+            <a:srgbClr val="FF0000"/>
+          </a:solidFill>
+          <a:ln w="19050">
+            <a:solidFill>
+              <a:srgbClr val="0070C0"/>
+            </a:solidFill>
+          </a:ln>
+        </p:spPr>
+        <p:style>
+          <a:lnRef idx="2">
+            <a:schemeClr val="accent1">
+              <a:shade val="50000"/>
+            </a:schemeClr>
+          </a:lnRef>
+          <a:fillRef idx="1">
+            <a:schemeClr val="accent1"/>
+          </a:fillRef>
+          <a:effectRef idx="0">
+            <a:schemeClr val="accent1"/>
+          </a:effectRef>
+          <a:fontRef idx="minor">
+            <a:schemeClr val="lt1"/>
+          </a:fontRef>
+        </p:style>
+        <p:txBody>
+          <a:bodyPr rtlCol="0" anchor="ctr"/>
+          <a:lstStyle/>
+          <a:p>
+            <a:pPr algn="ctr"/>
+            <a:r>
+              <a:rPr lang="en-US" sz="2400" b="1" dirty="0" smtClean="0">
+                <a:solidFill>
+                  <a:schemeClr val="bg1"/>
+                </a:solidFill>
+              </a:rPr>
+              <a:t>L</a:t>
+            </a:r>
+            <a:endParaRPr lang="en-US" sz="2400" b="1" dirty="0">
+              <a:solidFill>
+                <a:schemeClr val="bg1"/>
+              </a:solidFill>
+            </a:endParaRPr>
+          </a:p>
+        </p:txBody>
+      </p:sp>
+      <p:sp>
+        <p:nvSpPr>
+          <p:cNvPr id="24" name="Rounded Rectangle 23"/>
+          <p:cNvSpPr/>
+          <p:nvPr/>
+        </p:nvSpPr>
+        <p:spPr>
+          <a:xfrm>
+            <a:off x="8339303" y="4513486"/>
+            <a:ext cx="1182501" cy="1171891"/>
+          </a:xfrm>
+          <a:prstGeom prst="roundRect">
+            <a:avLst/>
+          </a:prstGeom>
+          <a:solidFill>
+            <a:srgbClr val="4372C4"/>
+          </a:solidFill>
+          <a:ln w="28575" cap="flat" cmpd="sng" algn="ctr">
+            <a:solidFill>
+              <a:schemeClr val="tx2"/>
+            </a:solidFill>
+            <a:prstDash val="solid"/>
+          </a:ln>
+          <a:effectLst>
+            <a:outerShdw blurRad="40000" dist="23000" dir="5400000" rotWithShape="0">
+              <a:srgbClr val="000000">
+                <a:alpha val="35000"/>
+              </a:srgbClr>
+            </a:outerShdw>
+          </a:effectLst>
+        </p:spPr>
+        <p:txBody>
+          <a:bodyPr tIns="36000" bIns="36000" rtlCol="0" anchor="ctr"/>
+          <a:lstStyle/>
+          <a:p>
+            <a:pPr marL="0" marR="0" lvl="0" indent="0" algn="ctr" defTabSz="457200" eaLnBrk="1" fontAlgn="auto" latinLnBrk="0" hangingPunct="1">
+              <a:lnSpc>
+                <a:spcPct val="100000"/>
+              </a:lnSpc>
+              <a:spcBef>
+                <a:spcPts val="0"/>
+              </a:spcBef>
+              <a:spcAft>
+                <a:spcPts val="0"/>
+              </a:spcAft>
+              <a:buClrTx/>
+              <a:buSzTx/>
+              <a:buFontTx/>
+              <a:buNone/>
+              <a:tabLst/>
+              <a:defRPr/>
+            </a:pPr>
+            <a:r>
+              <a:rPr lang="en-US" sz="2400" b="1" kern="0" noProof="0" dirty="0" smtClean="0">
+                <a:solidFill>
+                  <a:schemeClr val="bg1"/>
+                </a:solidFill>
+                <a:ea typeface=""/>
+                <a:cs typeface=""/>
+              </a:rPr>
+              <a:t>P</a:t>
+            </a:r>
+            <a:endParaRPr kumimoji="0" lang="en-US" sz="2400" b="1" i="0" u="none" strike="noStrike" kern="0" cap="none" spc="0" normalizeH="0" baseline="0" noProof="0" dirty="0" smtClean="0">
+              <a:ln>
+                <a:noFill/>
+              </a:ln>
+              <a:solidFill>
+                <a:schemeClr val="bg1"/>
+              </a:solidFill>
+              <a:effectLst/>
+              <a:uLnTx/>
+              <a:uFillTx/>
+              <a:ea typeface=""/>
+              <a:cs typeface=""/>
+            </a:endParaRPr>
+          </a:p>
+        </p:txBody>
+      </p:sp>
+      <p:sp>
+        <p:nvSpPr>
+          <p:cNvPr id="25" name="Document 24"/>
+          <p:cNvSpPr/>
+          <p:nvPr/>
+        </p:nvSpPr>
+        <p:spPr>
+          <a:xfrm>
+            <a:off x="9321632" y="5439776"/>
+            <a:ext cx="1157302" cy="916572"/>
+          </a:xfrm>
+          <a:prstGeom prst="flowChartDocument">
+            <a:avLst/>
+          </a:prstGeom>
+          <a:solidFill>
+            <a:srgbClr val="FF0000"/>
+          </a:solidFill>
+          <a:ln w="19050">
+            <a:solidFill>
+              <a:srgbClr val="0070C0"/>
+            </a:solidFill>
+          </a:ln>
+        </p:spPr>
+        <p:style>
+          <a:lnRef idx="2">
+            <a:schemeClr val="accent1">
+              <a:shade val="50000"/>
+            </a:schemeClr>
+          </a:lnRef>
+          <a:fillRef idx="1">
+            <a:schemeClr val="accent1"/>
+          </a:fillRef>
+          <a:effectRef idx="0">
+            <a:schemeClr val="accent1"/>
+          </a:effectRef>
+          <a:fontRef idx="minor">
+            <a:schemeClr val="lt1"/>
+          </a:fontRef>
+        </p:style>
+        <p:txBody>
+          <a:bodyPr rtlCol="0" anchor="ctr"/>
+          <a:lstStyle/>
+          <a:p>
+            <a:pPr algn="ctr"/>
+            <a:r>
+              <a:rPr lang="en-US" sz="2400" b="1" dirty="0" smtClean="0">
+                <a:solidFill>
+                  <a:schemeClr val="bg1"/>
+                </a:solidFill>
+              </a:rPr>
+              <a:t>L</a:t>
+            </a:r>
+            <a:endParaRPr lang="en-US" sz="2400" b="1" dirty="0">
+              <a:solidFill>
+                <a:schemeClr val="bg1"/>
+              </a:solidFill>
+            </a:endParaRPr>
+          </a:p>
+        </p:txBody>
+      </p:sp>
+      <p:sp>
+        <p:nvSpPr>
+          <p:cNvPr id="3" name="Oval 2"/>
+          <p:cNvSpPr/>
+          <p:nvPr/>
+        </p:nvSpPr>
+        <p:spPr>
+          <a:xfrm>
+            <a:off x="4554163" y="4124609"/>
+            <a:ext cx="451995" cy="451995"/>
+          </a:xfrm>
+          <a:prstGeom prst="ellipse">
+            <a:avLst/>
+          </a:prstGeom>
+          <a:solidFill>
+            <a:schemeClr val="bg1"/>
+          </a:solidFill>
+          <a:ln w="28575">
+            <a:solidFill>
+              <a:srgbClr val="FF0000"/>
+            </a:solidFill>
+          </a:ln>
+        </p:spPr>
+        <p:style>
+          <a:lnRef idx="2">
+            <a:schemeClr val="accent1">
+              <a:shade val="50000"/>
+            </a:schemeClr>
+          </a:lnRef>
+          <a:fillRef idx="1">
+            <a:schemeClr val="accent1"/>
+          </a:fillRef>
+          <a:effectRef idx="0">
+            <a:schemeClr val="accent1"/>
+          </a:effectRef>
+          <a:fontRef idx="minor">
+            <a:schemeClr val="lt1"/>
+          </a:fontRef>
+        </p:style>
+        <p:txBody>
+          <a:bodyPr rtlCol="0" anchor="ctr"/>
+          <a:lstStyle/>
+          <a:p>
+            <a:pPr algn="ctr"/>
+            <a:r>
+              <a:rPr lang="en-US" sz="3200" b="1" dirty="0" smtClean="0">
+                <a:solidFill>
+                  <a:srgbClr val="FF0000"/>
+                </a:solidFill>
+                <a:latin typeface="Courier New" charset="0"/>
+                <a:ea typeface="Courier New" charset="0"/>
+                <a:cs typeface="Courier New" charset="0"/>
+              </a:rPr>
+              <a:t>+</a:t>
+            </a:r>
+            <a:endParaRPr lang="en-US" b="1" dirty="0">
+              <a:solidFill>
+                <a:srgbClr val="FF0000"/>
+              </a:solidFill>
+              <a:latin typeface="Courier New" charset="0"/>
+              <a:ea typeface="Courier New" charset="0"/>
+              <a:cs typeface="Courier New" charset="0"/>
+            </a:endParaRPr>
+          </a:p>
+        </p:txBody>
+      </p:sp>
+    </p:spTree>
+    <p:extLst>
+      <p:ext uri="{BB962C8B-B14F-4D97-AF65-F5344CB8AC3E}">
+        <p14:creationId xmlns:p14="http://schemas.microsoft.com/office/powerpoint/2010/main" val="1498710450"/>
+      </p:ext>
+    </p:extLst>
+  </p:cSld>
+  <p:clrMapOvr>
+    <a:masterClrMapping/>
+  </p:clrMapOvr>
+  <p:timing>
+    <p:tnLst>
+      <p:par>
+        <p:cTn id="1" dur="indefinite" restart="never" nodeType="tmRoot"/>
+      </p:par>
+    </p:tnLst>
+  </p:timing>
 </p:sld>
 </file>
 
@@ -52253,13 +56242,18 @@
           <a:p>
             <a:pPr algn="ctr"/>
             <a:r>
-              <a:rPr lang="en-US" sz="2400" b="1" dirty="0">
+              <a:rPr lang="en-US" sz="2400" b="1" dirty="0" smtClean="0">
                 <a:solidFill>
-                  <a:srgbClr val="4372C4"/>
+                  <a:schemeClr val="tx1"/>
                 </a:solidFill>
               </a:rPr>
               <a:t>O</a:t>
             </a:r>
+            <a:endParaRPr lang="en-US" sz="2400" b="1" dirty="0">
+              <a:solidFill>
+                <a:schemeClr val="tx1"/>
+              </a:solidFill>
+            </a:endParaRPr>
           </a:p>
         </p:txBody>
       </p:sp>

</xml_diff>